<commit_message>
First draft of finished slides for Module 1
</commit_message>
<xml_diff>
--- a/docs/Module 1.pptx
+++ b/docs/Module 1.pptx
@@ -36,6 +36,16 @@
     <p:sldId id="283" r:id="rId31"/>
     <p:sldId id="284" r:id="rId32"/>
     <p:sldId id="285" r:id="rId33"/>
+    <p:sldId id="286" r:id="rId34"/>
+    <p:sldId id="287" r:id="rId35"/>
+    <p:sldId id="288" r:id="rId36"/>
+    <p:sldId id="289" r:id="rId37"/>
+    <p:sldId id="290" r:id="rId38"/>
+    <p:sldId id="291" r:id="rId39"/>
+    <p:sldId id="292" r:id="rId40"/>
+    <p:sldId id="293" r:id="rId41"/>
+    <p:sldId id="294" r:id="rId42"/>
+    <p:sldId id="295" r:id="rId43"/>
   </p:sldIdLst>
   <p:sldSz cx="10080625" cy="7559675"/>
   <p:notesSz cx="7559675" cy="10691812"/>
@@ -3166,7 +3176,7 @@
           <a:bodyPr lIns="0" rIns="0" tIns="0" bIns="0"/>
           <a:p>
             <a:pPr algn="r"/>
-            <a:fld id="{F990E427-7B02-4624-8197-92057C3BFBD5}" type="slidenum">
+            <a:fld id="{6BA5A827-5922-4214-94B4-74BCB90BC8AE}" type="slidenum">
               <a:rPr b="0" lang="en-IE" sz="1400" spc="-1" strike="noStrike">
                 <a:latin typeface="Times New Roman"/>
               </a:rPr>
@@ -3639,7 +3649,7 @@
           <a:bodyPr lIns="0" rIns="0" tIns="0" bIns="0"/>
           <a:p>
             <a:pPr algn="r"/>
-            <a:fld id="{C125EBED-417F-4D99-B783-8DBB92A23941}" type="slidenum">
+            <a:fld id="{4497C85E-7808-49E3-B196-C4A77F033E42}" type="slidenum">
               <a:rPr b="0" lang="en-IE" sz="1400" spc="-1" strike="noStrike">
                 <a:latin typeface="Times New Roman"/>
               </a:rPr>
@@ -4147,34 +4157,7 @@
                 </a:solidFill>
                 <a:latin typeface="Arial"/>
               </a:rPr>
-              <a:t>.  That is, data values may need to </a:t>
-            </a:r>
-            <a:r>
-              <a:rPr b="0" lang="en-IE" sz="3200" spc="-1" strike="noStrike">
-                <a:solidFill>
-                  <a:srgbClr val="0066cc"/>
-                </a:solidFill>
-                <a:latin typeface="Arial"/>
-              </a:rPr>
-              <a:t>be reorganized in various ways so that one </a:t>
-            </a:r>
-            <a:r>
-              <a:rPr b="0" lang="en-IE" sz="3200" spc="-1" strike="noStrike">
-                <a:solidFill>
-                  <a:srgbClr val="0066cc"/>
-                </a:solidFill>
-                <a:latin typeface="Arial"/>
-              </a:rPr>
-              <a:t>data field does not have an outsized effect on </a:t>
-            </a:r>
-            <a:r>
-              <a:rPr b="0" lang="en-IE" sz="3200" spc="-1" strike="noStrike">
-                <a:solidFill>
-                  <a:srgbClr val="0066cc"/>
-                </a:solidFill>
-                <a:latin typeface="Arial"/>
-              </a:rPr>
-              <a:t>the algorithms used.  </a:t>
+              <a:t>.  That is, data values may need to be reorganized in various ways so that one data field does not have an outsized effect on the algorithms used.  </a:t>
             </a:r>
             <a:endParaRPr b="0" lang="en-IE" sz="3200" spc="-1" strike="noStrike">
               <a:solidFill>
@@ -4334,108 +4317,63 @@
                 </a:solidFill>
                 <a:latin typeface="Arial"/>
               </a:rPr>
-              <a:t>Often, raw data will contain fields that are </a:t>
-            </a:r>
-            <a:r>
-              <a:rPr b="0" lang="en-IE" sz="3200" spc="-1" strike="noStrike">
-                <a:solidFill>
-                  <a:srgbClr val="0066cc"/>
-                </a:solidFill>
-                <a:latin typeface="Arial"/>
-              </a:rPr>
-              <a:t>extraneous or unnecessary for the project that </a:t>
-            </a:r>
-            <a:r>
-              <a:rPr b="0" lang="en-IE" sz="3200" spc="-1" strike="noStrike">
-                <a:solidFill>
-                  <a:srgbClr val="0066cc"/>
-                </a:solidFill>
-                <a:latin typeface="Arial"/>
-              </a:rPr>
-              <a:t>is being undertaken. </a:t>
-            </a:r>
-            <a:endParaRPr b="0" lang="en-IE" sz="3200" spc="-1" strike="noStrike">
-              <a:solidFill>
-                <a:srgbClr val="0066cc"/>
-              </a:solidFill>
-              <a:latin typeface="Arial"/>
-            </a:endParaRPr>
-          </a:p>
-          <a:p>
-            <a:pPr marL="432000" indent="-324000">
-              <a:spcBef>
-                <a:spcPts val="1417"/>
-              </a:spcBef>
-              <a:buClr>
-                <a:srgbClr val="000000"/>
-              </a:buClr>
-              <a:buSzPct val="45000"/>
-              <a:buFont typeface="Wingdings" charset="2"/>
-              <a:buChar char=""/>
-            </a:pPr>
-            <a:r>
-              <a:rPr b="0" lang="en-IE" sz="3200" spc="-1" strike="noStrike">
-                <a:solidFill>
-                  <a:srgbClr val="0066cc"/>
-                </a:solidFill>
-                <a:latin typeface="Arial"/>
-              </a:rPr>
-              <a:t>The DS must choose the relevant subset of </a:t>
-            </a:r>
-            <a:r>
-              <a:rPr b="0" lang="en-IE" sz="3200" spc="-1" strike="noStrike">
-                <a:solidFill>
-                  <a:srgbClr val="0066cc"/>
-                </a:solidFill>
-                <a:latin typeface="Arial"/>
-              </a:rPr>
-              <a:t>data necessary.  This is where exploratory </a:t>
-            </a:r>
-            <a:r>
-              <a:rPr b="0" lang="en-IE" sz="3200" spc="-1" strike="noStrike">
-                <a:solidFill>
-                  <a:srgbClr val="0066cc"/>
-                </a:solidFill>
-                <a:latin typeface="Arial"/>
-              </a:rPr>
-              <a:t>analysis becomes useful. </a:t>
-            </a:r>
-            <a:endParaRPr b="0" lang="en-IE" sz="3200" spc="-1" strike="noStrike">
-              <a:solidFill>
-                <a:srgbClr val="0066cc"/>
-              </a:solidFill>
-              <a:latin typeface="Arial"/>
-            </a:endParaRPr>
-          </a:p>
-          <a:p>
-            <a:pPr marL="432000" indent="-324000">
-              <a:spcBef>
-                <a:spcPts val="1417"/>
-              </a:spcBef>
-              <a:buClr>
-                <a:srgbClr val="000000"/>
-              </a:buClr>
-              <a:buSzPct val="45000"/>
-              <a:buFont typeface="Wingdings" charset="2"/>
-              <a:buChar char=""/>
-            </a:pPr>
-            <a:r>
-              <a:rPr b="0" lang="en-IE" sz="3200" spc="-1" strike="noStrike">
-                <a:solidFill>
-                  <a:srgbClr val="0066cc"/>
-                </a:solidFill>
-                <a:latin typeface="Arial"/>
-              </a:rPr>
-              <a:t>Picking fields with proper correlations becomes </a:t>
-            </a:r>
-            <a:r>
-              <a:rPr b="0" lang="en-IE" sz="3200" spc="-1" strike="noStrike">
-                <a:solidFill>
-                  <a:srgbClr val="0066cc"/>
-                </a:solidFill>
-                <a:latin typeface="Arial"/>
-              </a:rPr>
-              <a:t>important. </a:t>
+              <a:t>Often, raw data will contain fields that are extraneous or unnecessary for the project that is being undertaken. </a:t>
+            </a:r>
+            <a:endParaRPr b="0" lang="en-IE" sz="3200" spc="-1" strike="noStrike">
+              <a:solidFill>
+                <a:srgbClr val="0066cc"/>
+              </a:solidFill>
+              <a:latin typeface="Arial"/>
+            </a:endParaRPr>
+          </a:p>
+          <a:p>
+            <a:pPr marL="432000" indent="-324000">
+              <a:spcBef>
+                <a:spcPts val="1417"/>
+              </a:spcBef>
+              <a:buClr>
+                <a:srgbClr val="000000"/>
+              </a:buClr>
+              <a:buSzPct val="45000"/>
+              <a:buFont typeface="Wingdings" charset="2"/>
+              <a:buChar char=""/>
+            </a:pPr>
+            <a:r>
+              <a:rPr b="0" lang="en-IE" sz="3200" spc="-1" strike="noStrike">
+                <a:solidFill>
+                  <a:srgbClr val="0066cc"/>
+                </a:solidFill>
+                <a:latin typeface="Arial"/>
+              </a:rPr>
+              <a:t>The DS must choose the relevant subset of data necessary.  This is where exploratory analysis becomes useful. </a:t>
+            </a:r>
+            <a:endParaRPr b="0" lang="en-IE" sz="3200" spc="-1" strike="noStrike">
+              <a:solidFill>
+                <a:srgbClr val="0066cc"/>
+              </a:solidFill>
+              <a:latin typeface="Arial"/>
+            </a:endParaRPr>
+          </a:p>
+          <a:p>
+            <a:pPr marL="432000" indent="-324000">
+              <a:spcBef>
+                <a:spcPts val="1417"/>
+              </a:spcBef>
+              <a:buClr>
+                <a:srgbClr val="000000"/>
+              </a:buClr>
+              <a:buSzPct val="45000"/>
+              <a:buFont typeface="Wingdings" charset="2"/>
+              <a:buChar char=""/>
+            </a:pPr>
+            <a:r>
+              <a:rPr b="0" lang="en-IE" sz="3200" spc="-1" strike="noStrike">
+                <a:solidFill>
+                  <a:srgbClr val="0066cc"/>
+                </a:solidFill>
+                <a:latin typeface="Arial"/>
+              </a:rPr>
+              <a:t>Picking fields with proper correlations becomes important. </a:t>
             </a:r>
             <a:endParaRPr b="0" lang="en-IE" sz="3200" spc="-1" strike="noStrike">
               <a:solidFill>
@@ -5036,63 +4974,108 @@
                 </a:solidFill>
                 <a:latin typeface="Arial"/>
               </a:rPr>
-              <a:t>Among the primary tools we will be using is the Python programming language.  </a:t>
-            </a:r>
-            <a:endParaRPr b="0" lang="en-IE" sz="3200" spc="-1" strike="noStrike">
-              <a:solidFill>
-                <a:srgbClr val="0066cc"/>
-              </a:solidFill>
-              <a:latin typeface="Arial"/>
-            </a:endParaRPr>
-          </a:p>
-          <a:p>
-            <a:pPr marL="432000" indent="-324000">
-              <a:spcBef>
-                <a:spcPts val="1417"/>
-              </a:spcBef>
-              <a:buClr>
-                <a:srgbClr val="000000"/>
-              </a:buClr>
-              <a:buSzPct val="45000"/>
-              <a:buFont typeface="Wingdings" charset="2"/>
-              <a:buChar char=""/>
-            </a:pPr>
-            <a:r>
-              <a:rPr b="0" lang="en-IE" sz="3200" spc="-1" strike="noStrike">
-                <a:solidFill>
-                  <a:srgbClr val="0066cc"/>
-                </a:solidFill>
-                <a:latin typeface="Arial"/>
-              </a:rPr>
-              <a:t>We will be using version 3.&lt;Replace this with the correct version&gt; for our labs. </a:t>
-            </a:r>
-            <a:endParaRPr b="0" lang="en-IE" sz="3200" spc="-1" strike="noStrike">
-              <a:solidFill>
-                <a:srgbClr val="0066cc"/>
-              </a:solidFill>
-              <a:latin typeface="Arial"/>
-            </a:endParaRPr>
-          </a:p>
-          <a:p>
-            <a:pPr marL="432000" indent="-324000">
-              <a:spcBef>
-                <a:spcPts val="1417"/>
-              </a:spcBef>
-              <a:buClr>
-                <a:srgbClr val="000000"/>
-              </a:buClr>
-              <a:buSzPct val="45000"/>
-              <a:buFont typeface="Wingdings" charset="2"/>
-              <a:buChar char=""/>
-            </a:pPr>
-            <a:r>
-              <a:rPr b="0" lang="en-IE" sz="3200" spc="-1" strike="noStrike">
-                <a:solidFill>
-                  <a:srgbClr val="0066cc"/>
-                </a:solidFill>
-                <a:latin typeface="Arial"/>
-              </a:rPr>
-              <a:t>As well, will be employing a number of libraries and API’s to make it easy to create programs and systems that will allow us to easily extract and analyze data. </a:t>
+              <a:t>Among the primary tools we will be using is the </a:t>
+            </a:r>
+            <a:r>
+              <a:rPr b="0" lang="en-IE" sz="3200" spc="-1" strike="noStrike">
+                <a:solidFill>
+                  <a:srgbClr val="0066cc"/>
+                </a:solidFill>
+                <a:latin typeface="Arial"/>
+              </a:rPr>
+              <a:t>Python programming language.  </a:t>
+            </a:r>
+            <a:endParaRPr b="0" lang="en-IE" sz="3200" spc="-1" strike="noStrike">
+              <a:solidFill>
+                <a:srgbClr val="0066cc"/>
+              </a:solidFill>
+              <a:latin typeface="Arial"/>
+            </a:endParaRPr>
+          </a:p>
+          <a:p>
+            <a:pPr marL="432000" indent="-324000">
+              <a:spcBef>
+                <a:spcPts val="1417"/>
+              </a:spcBef>
+              <a:buClr>
+                <a:srgbClr val="000000"/>
+              </a:buClr>
+              <a:buSzPct val="45000"/>
+              <a:buFont typeface="Wingdings" charset="2"/>
+              <a:buChar char=""/>
+            </a:pPr>
+            <a:r>
+              <a:rPr b="0" lang="en-IE" sz="3200" spc="-1" strike="noStrike">
+                <a:solidFill>
+                  <a:srgbClr val="0066cc"/>
+                </a:solidFill>
+                <a:latin typeface="Arial"/>
+              </a:rPr>
+              <a:t>We will be using version 3.&lt;Replace this with </a:t>
+            </a:r>
+            <a:r>
+              <a:rPr b="0" lang="en-IE" sz="3200" spc="-1" strike="noStrike">
+                <a:solidFill>
+                  <a:srgbClr val="0066cc"/>
+                </a:solidFill>
+                <a:latin typeface="Arial"/>
+              </a:rPr>
+              <a:t>the correct version&gt; for our labs. </a:t>
+            </a:r>
+            <a:endParaRPr b="0" lang="en-IE" sz="3200" spc="-1" strike="noStrike">
+              <a:solidFill>
+                <a:srgbClr val="0066cc"/>
+              </a:solidFill>
+              <a:latin typeface="Arial"/>
+            </a:endParaRPr>
+          </a:p>
+          <a:p>
+            <a:pPr marL="432000" indent="-324000">
+              <a:spcBef>
+                <a:spcPts val="1417"/>
+              </a:spcBef>
+              <a:buClr>
+                <a:srgbClr val="000000"/>
+              </a:buClr>
+              <a:buSzPct val="45000"/>
+              <a:buFont typeface="Wingdings" charset="2"/>
+              <a:buChar char=""/>
+            </a:pPr>
+            <a:r>
+              <a:rPr b="0" lang="en-IE" sz="3200" spc="-1" strike="noStrike">
+                <a:solidFill>
+                  <a:srgbClr val="0066cc"/>
+                </a:solidFill>
+                <a:latin typeface="Arial"/>
+              </a:rPr>
+              <a:t>As well, will be employing a number of libraries </a:t>
+            </a:r>
+            <a:r>
+              <a:rPr b="0" lang="en-IE" sz="3200" spc="-1" strike="noStrike">
+                <a:solidFill>
+                  <a:srgbClr val="0066cc"/>
+                </a:solidFill>
+                <a:latin typeface="Arial"/>
+              </a:rPr>
+              <a:t>and API’s to make it easy to create programs </a:t>
+            </a:r>
+            <a:r>
+              <a:rPr b="0" lang="en-IE" sz="3200" spc="-1" strike="noStrike">
+                <a:solidFill>
+                  <a:srgbClr val="0066cc"/>
+                </a:solidFill>
+                <a:latin typeface="Arial"/>
+              </a:rPr>
+              <a:t>and systems that will allow us to easily extract </a:t>
+            </a:r>
+            <a:r>
+              <a:rPr b="0" lang="en-IE" sz="3200" spc="-1" strike="noStrike">
+                <a:solidFill>
+                  <a:srgbClr val="0066cc"/>
+                </a:solidFill>
+                <a:latin typeface="Arial"/>
+              </a:rPr>
+              <a:t>and analyze data. </a:t>
             </a:r>
             <a:endParaRPr b="0" lang="en-IE" sz="3200" spc="-1" strike="noStrike">
               <a:solidFill>
@@ -5233,63 +5216,117 @@
                 </a:solidFill>
                 <a:latin typeface="Arial"/>
               </a:rPr>
-              <a:t>Python uses the concept of a REPL.  REPL is an acronym for Read – Eval – Print – Loop. </a:t>
-            </a:r>
-            <a:endParaRPr b="0" lang="en-IE" sz="3200" spc="-1" strike="noStrike">
-              <a:solidFill>
-                <a:srgbClr val="0066cc"/>
-              </a:solidFill>
-              <a:latin typeface="Arial"/>
-            </a:endParaRPr>
-          </a:p>
-          <a:p>
-            <a:pPr marL="432000" indent="-324000">
-              <a:spcBef>
-                <a:spcPts val="1417"/>
-              </a:spcBef>
-              <a:buClr>
-                <a:srgbClr val="000000"/>
-              </a:buClr>
-              <a:buSzPct val="45000"/>
-              <a:buFont typeface="Wingdings" charset="2"/>
-              <a:buChar char=""/>
-            </a:pPr>
-            <a:r>
-              <a:rPr b="0" lang="en-IE" sz="3200" spc="-1" strike="noStrike">
-                <a:solidFill>
-                  <a:srgbClr val="0066cc"/>
-                </a:solidFill>
-                <a:latin typeface="Arial"/>
-              </a:rPr>
-              <a:t>A REPL is simply an interactive shell that allows us to type in simple Python programs and run them directly. </a:t>
-            </a:r>
-            <a:endParaRPr b="0" lang="en-IE" sz="3200" spc="-1" strike="noStrike">
-              <a:solidFill>
-                <a:srgbClr val="0066cc"/>
-              </a:solidFill>
-              <a:latin typeface="Arial"/>
-            </a:endParaRPr>
-          </a:p>
-          <a:p>
-            <a:pPr marL="432000" indent="-324000">
-              <a:spcBef>
-                <a:spcPts val="1417"/>
-              </a:spcBef>
-              <a:buClr>
-                <a:srgbClr val="000000"/>
-              </a:buClr>
-              <a:buSzPct val="45000"/>
-              <a:buFont typeface="Wingdings" charset="2"/>
-              <a:buChar char=""/>
-            </a:pPr>
-            <a:r>
-              <a:rPr b="0" lang="en-IE" sz="3200" spc="-1" strike="noStrike">
-                <a:solidFill>
-                  <a:srgbClr val="0066cc"/>
-                </a:solidFill>
-                <a:latin typeface="Arial"/>
-              </a:rPr>
-              <a:t>Python ships with a REPL application already available as part of the distribution.  Other, more powerful and modern REPL’s, such as iPython are also available.</a:t>
+              <a:t>Python uses the concept of a REPL.  REPL is </a:t>
+            </a:r>
+            <a:r>
+              <a:rPr b="0" lang="en-IE" sz="3200" spc="-1" strike="noStrike">
+                <a:solidFill>
+                  <a:srgbClr val="0066cc"/>
+                </a:solidFill>
+                <a:latin typeface="Arial"/>
+              </a:rPr>
+              <a:t>an acronym for Read – Eval – Print – Loop. </a:t>
+            </a:r>
+            <a:endParaRPr b="0" lang="en-IE" sz="3200" spc="-1" strike="noStrike">
+              <a:solidFill>
+                <a:srgbClr val="0066cc"/>
+              </a:solidFill>
+              <a:latin typeface="Arial"/>
+            </a:endParaRPr>
+          </a:p>
+          <a:p>
+            <a:pPr marL="432000" indent="-324000">
+              <a:spcBef>
+                <a:spcPts val="1417"/>
+              </a:spcBef>
+              <a:buClr>
+                <a:srgbClr val="000000"/>
+              </a:buClr>
+              <a:buSzPct val="45000"/>
+              <a:buFont typeface="Wingdings" charset="2"/>
+              <a:buChar char=""/>
+            </a:pPr>
+            <a:r>
+              <a:rPr b="0" lang="en-IE" sz="3200" spc="-1" strike="noStrike">
+                <a:solidFill>
+                  <a:srgbClr val="0066cc"/>
+                </a:solidFill>
+                <a:latin typeface="Arial"/>
+              </a:rPr>
+              <a:t>A REPL is simply an interactive shell that </a:t>
+            </a:r>
+            <a:r>
+              <a:rPr b="0" lang="en-IE" sz="3200" spc="-1" strike="noStrike">
+                <a:solidFill>
+                  <a:srgbClr val="0066cc"/>
+                </a:solidFill>
+                <a:latin typeface="Arial"/>
+              </a:rPr>
+              <a:t>allows us to type in simple Python programs </a:t>
+            </a:r>
+            <a:r>
+              <a:rPr b="0" lang="en-IE" sz="3200" spc="-1" strike="noStrike">
+                <a:solidFill>
+                  <a:srgbClr val="0066cc"/>
+                </a:solidFill>
+                <a:latin typeface="Arial"/>
+              </a:rPr>
+              <a:t>and run them directly. </a:t>
+            </a:r>
+            <a:endParaRPr b="0" lang="en-IE" sz="3200" spc="-1" strike="noStrike">
+              <a:solidFill>
+                <a:srgbClr val="0066cc"/>
+              </a:solidFill>
+              <a:latin typeface="Arial"/>
+            </a:endParaRPr>
+          </a:p>
+          <a:p>
+            <a:pPr marL="432000" indent="-324000">
+              <a:spcBef>
+                <a:spcPts val="1417"/>
+              </a:spcBef>
+              <a:buClr>
+                <a:srgbClr val="000000"/>
+              </a:buClr>
+              <a:buSzPct val="45000"/>
+              <a:buFont typeface="Wingdings" charset="2"/>
+              <a:buChar char=""/>
+            </a:pPr>
+            <a:r>
+              <a:rPr b="0" lang="en-IE" sz="3200" spc="-1" strike="noStrike">
+                <a:solidFill>
+                  <a:srgbClr val="0066cc"/>
+                </a:solidFill>
+                <a:latin typeface="Arial"/>
+              </a:rPr>
+              <a:t>Python ships with a REPL application already </a:t>
+            </a:r>
+            <a:r>
+              <a:rPr b="0" lang="en-IE" sz="3200" spc="-1" strike="noStrike">
+                <a:solidFill>
+                  <a:srgbClr val="0066cc"/>
+                </a:solidFill>
+                <a:latin typeface="Arial"/>
+              </a:rPr>
+              <a:t>available as part of the distribution.  Other, </a:t>
+            </a:r>
+            <a:r>
+              <a:rPr b="0" lang="en-IE" sz="3200" spc="-1" strike="noStrike">
+                <a:solidFill>
+                  <a:srgbClr val="0066cc"/>
+                </a:solidFill>
+                <a:latin typeface="Arial"/>
+              </a:rPr>
+              <a:t>more powerful and modern REPL’s, such as </a:t>
+            </a:r>
+            <a:r>
+              <a:rPr b="0" lang="en-IE" sz="3200" spc="-1" strike="noStrike">
+                <a:solidFill>
+                  <a:srgbClr val="0066cc"/>
+                </a:solidFill>
+                <a:latin typeface="Arial"/>
+              </a:rPr>
+              <a:t>iPython are also available.</a:t>
             </a:r>
             <a:endParaRPr b="0" lang="en-IE" sz="3200" spc="-1" strike="noStrike">
               <a:solidFill>
@@ -5792,7 +5829,16 @@
                 </a:solidFill>
                 <a:latin typeface="Arial"/>
               </a:rPr>
-              <a:t> can store different types of data. </a:t>
+              <a:t> can store </a:t>
+            </a:r>
+            <a:r>
+              <a:rPr b="0" lang="en-IE" sz="3200" spc="-1" strike="noStrike">
+                <a:solidFill>
+                  <a:srgbClr val="0066cc"/>
+                </a:solidFill>
+                <a:latin typeface="Arial"/>
+              </a:rPr>
+              <a:t>different types of data. </a:t>
             </a:r>
             <a:endParaRPr b="0" lang="en-IE" sz="3200" spc="-1" strike="noStrike">
               <a:solidFill>
@@ -6187,7 +6233,16 @@
                 </a:solidFill>
                 <a:latin typeface="Arial"/>
               </a:rPr>
-              <a:t>Python variables can hold different types of data.  For example:</a:t>
+              <a:t>Python variables can hold different types of </a:t>
+            </a:r>
+            <a:r>
+              <a:rPr b="0" lang="en-IE" sz="3200" spc="-1" strike="noStrike">
+                <a:solidFill>
+                  <a:srgbClr val="0066cc"/>
+                </a:solidFill>
+                <a:latin typeface="Arial"/>
+              </a:rPr>
+              <a:t>data.  For example:</a:t>
             </a:r>
             <a:endParaRPr b="0" lang="en-IE" sz="3200" spc="-1" strike="noStrike">
               <a:solidFill>
@@ -6281,7 +6336,16 @@
                 </a:solidFill>
                 <a:latin typeface="Arial"/>
               </a:rPr>
-              <a:t>case sensitive!</a:t>
+              <a:t>case </a:t>
+            </a:r>
+            <a:r>
+              <a:rPr b="0" i="1" lang="en-IE" sz="3200" spc="-1" strike="noStrike">
+                <a:solidFill>
+                  <a:srgbClr val="0066cc"/>
+                </a:solidFill>
+                <a:latin typeface="Arial"/>
+              </a:rPr>
+              <a:t>sensitive!</a:t>
             </a:r>
             <a:endParaRPr b="0" lang="en-IE" sz="3200" spc="-1" strike="noStrike">
               <a:solidFill>
@@ -6791,7 +6855,16 @@
                 </a:solidFill>
                 <a:latin typeface="Arial"/>
               </a:rPr>
-              <a:t>We can do arithmetic and other operations on variables as well. </a:t>
+              <a:t>We can do arithmetic and other operations on </a:t>
+            </a:r>
+            <a:r>
+              <a:rPr b="0" lang="en-IE" sz="3200" spc="-1" strike="noStrike">
+                <a:solidFill>
+                  <a:srgbClr val="0066cc"/>
+                </a:solidFill>
+                <a:latin typeface="Arial"/>
+              </a:rPr>
+              <a:t>variables as well. </a:t>
             </a:r>
             <a:endParaRPr b="0" lang="en-IE" sz="3200" spc="-1" strike="noStrike">
               <a:solidFill>
@@ -8072,7 +8145,16 @@
                 </a:solidFill>
                 <a:latin typeface="Arial"/>
               </a:rPr>
-              <a:t> associated with them. </a:t>
+              <a:t> associated with </a:t>
+            </a:r>
+            <a:r>
+              <a:rPr b="0" lang="en-IE" sz="3200" spc="-1" strike="noStrike">
+                <a:solidFill>
+                  <a:srgbClr val="0066cc"/>
+                </a:solidFill>
+                <a:latin typeface="Arial"/>
+              </a:rPr>
+              <a:t>them. </a:t>
             </a:r>
             <a:endParaRPr b="0" lang="en-IE" sz="3200" spc="-1" strike="noStrike">
               <a:solidFill>
@@ -8202,16 +8284,34 @@
                 </a:solidFill>
                 <a:latin typeface="Arial"/>
               </a:rPr>
-              <a:t> method</a:t>
-            </a:r>
-            <a:r>
-              <a:rPr b="0" lang="en-IE" sz="3200" spc="-1" strike="noStrike">
-                <a:solidFill>
-                  <a:srgbClr val="0066cc"/>
-                </a:solidFill>
-                <a:latin typeface="Arial"/>
-              </a:rPr>
-              <a:t> using the value in the variable.  The output here is: ‘HELLO WORLD’</a:t>
+              <a:t> </a:t>
+            </a:r>
+            <a:r>
+              <a:rPr b="0" lang="en-IE" sz="3200" spc="-1" strike="noStrike">
+                <a:solidFill>
+                  <a:srgbClr val="0066cc"/>
+                </a:solidFill>
+                <a:latin typeface="Arial"/>
+              </a:rPr>
+              <a:t>method</a:t>
+            </a:r>
+            <a:r>
+              <a:rPr b="0" lang="en-IE" sz="3200" spc="-1" strike="noStrike">
+                <a:solidFill>
+                  <a:srgbClr val="0066cc"/>
+                </a:solidFill>
+                <a:latin typeface="Arial"/>
+              </a:rPr>
+              <a:t> using the value in the variable.  The </a:t>
+            </a:r>
+            <a:r>
+              <a:rPr b="0" lang="en-IE" sz="3200" spc="-1" strike="noStrike">
+                <a:solidFill>
+                  <a:srgbClr val="0066cc"/>
+                </a:solidFill>
+                <a:latin typeface="Arial"/>
+              </a:rPr>
+              <a:t>output here is: ‘HELLO WORLD’</a:t>
             </a:r>
             <a:endParaRPr b="0" lang="en-IE" sz="3200" spc="-1" strike="noStrike">
               <a:solidFill>
@@ -8787,92 +8887,119 @@
                 </a:solidFill>
                 <a:latin typeface="Arial"/>
               </a:rPr>
-              <a:t>As we saw with strings, we can use the [ ] notation to access individual elements or slices of a list. </a:t>
-            </a:r>
-            <a:endParaRPr b="0" lang="en-IE" sz="3200" spc="-1" strike="noStrike">
-              <a:solidFill>
-                <a:srgbClr val="0066cc"/>
-              </a:solidFill>
-              <a:latin typeface="Arial"/>
-            </a:endParaRPr>
-          </a:p>
-          <a:p>
-            <a:pPr marL="432000" indent="-324000">
-              <a:spcBef>
-                <a:spcPts val="1417"/>
-              </a:spcBef>
-              <a:buClr>
-                <a:srgbClr val="000000"/>
-              </a:buClr>
-              <a:buSzPct val="45000"/>
-              <a:buFont typeface="Wingdings" charset="2"/>
-              <a:buChar char=""/>
-            </a:pPr>
-            <a:endParaRPr b="0" lang="en-IE" sz="3200" spc="-1" strike="noStrike">
-              <a:solidFill>
-                <a:srgbClr val="0066cc"/>
-              </a:solidFill>
-              <a:latin typeface="Arial"/>
-            </a:endParaRPr>
-          </a:p>
-          <a:p>
-            <a:pPr marL="432000" indent="-324000">
-              <a:spcBef>
-                <a:spcPts val="1417"/>
-              </a:spcBef>
-              <a:buClr>
-                <a:srgbClr val="000000"/>
-              </a:buClr>
-              <a:buSzPct val="45000"/>
-              <a:buFont typeface="Wingdings" charset="2"/>
-              <a:buChar char=""/>
-            </a:pPr>
-            <a:endParaRPr b="0" lang="en-IE" sz="3200" spc="-1" strike="noStrike">
-              <a:solidFill>
-                <a:srgbClr val="0066cc"/>
-              </a:solidFill>
-              <a:latin typeface="Arial"/>
-            </a:endParaRPr>
-          </a:p>
-          <a:p>
-            <a:pPr marL="432000" indent="-324000">
-              <a:spcBef>
-                <a:spcPts val="1417"/>
-              </a:spcBef>
-              <a:buClr>
-                <a:srgbClr val="000000"/>
-              </a:buClr>
-              <a:buSzPct val="45000"/>
-              <a:buFont typeface="Wingdings" charset="2"/>
-              <a:buChar char=""/>
-            </a:pPr>
-            <a:endParaRPr b="0" lang="en-IE" sz="3200" spc="-1" strike="noStrike">
-              <a:solidFill>
-                <a:srgbClr val="0066cc"/>
-              </a:solidFill>
-              <a:latin typeface="Arial"/>
-            </a:endParaRPr>
-          </a:p>
-          <a:p>
-            <a:pPr marL="432000" indent="-324000">
-              <a:spcBef>
-                <a:spcPts val="1417"/>
-              </a:spcBef>
-              <a:buClr>
-                <a:srgbClr val="000000"/>
-              </a:buClr>
-              <a:buSzPct val="45000"/>
-              <a:buFont typeface="Wingdings" charset="2"/>
-              <a:buChar char=""/>
-            </a:pPr>
-            <a:r>
-              <a:rPr b="0" lang="en-IE" sz="3200" spc="-1" strike="noStrike">
-                <a:solidFill>
-                  <a:srgbClr val="0066cc"/>
-                </a:solidFill>
-                <a:latin typeface="Arial"/>
-              </a:rPr>
-              <a:t>As with strings, the second number in the slice is the last position – 1.  </a:t>
+              <a:t>As we saw with strings, we can use the [ ] </a:t>
+            </a:r>
+            <a:r>
+              <a:rPr b="0" lang="en-IE" sz="3200" spc="-1" strike="noStrike">
+                <a:solidFill>
+                  <a:srgbClr val="0066cc"/>
+                </a:solidFill>
+                <a:latin typeface="Arial"/>
+              </a:rPr>
+              <a:t>notation to access individual elements or slices </a:t>
+            </a:r>
+            <a:r>
+              <a:rPr b="0" lang="en-IE" sz="3200" spc="-1" strike="noStrike">
+                <a:solidFill>
+                  <a:srgbClr val="0066cc"/>
+                </a:solidFill>
+                <a:latin typeface="Arial"/>
+              </a:rPr>
+              <a:t>of a list. </a:t>
+            </a:r>
+            <a:endParaRPr b="0" lang="en-IE" sz="3200" spc="-1" strike="noStrike">
+              <a:solidFill>
+                <a:srgbClr val="0066cc"/>
+              </a:solidFill>
+              <a:latin typeface="Arial"/>
+            </a:endParaRPr>
+          </a:p>
+          <a:p>
+            <a:pPr marL="432000" indent="-324000">
+              <a:spcBef>
+                <a:spcPts val="1417"/>
+              </a:spcBef>
+              <a:buClr>
+                <a:srgbClr val="000000"/>
+              </a:buClr>
+              <a:buSzPct val="45000"/>
+              <a:buFont typeface="Wingdings" charset="2"/>
+              <a:buChar char=""/>
+            </a:pPr>
+            <a:endParaRPr b="0" lang="en-IE" sz="3200" spc="-1" strike="noStrike">
+              <a:solidFill>
+                <a:srgbClr val="0066cc"/>
+              </a:solidFill>
+              <a:latin typeface="Arial"/>
+            </a:endParaRPr>
+          </a:p>
+          <a:p>
+            <a:pPr marL="432000" indent="-324000">
+              <a:spcBef>
+                <a:spcPts val="1417"/>
+              </a:spcBef>
+              <a:buClr>
+                <a:srgbClr val="000000"/>
+              </a:buClr>
+              <a:buSzPct val="45000"/>
+              <a:buFont typeface="Wingdings" charset="2"/>
+              <a:buChar char=""/>
+            </a:pPr>
+            <a:endParaRPr b="0" lang="en-IE" sz="3200" spc="-1" strike="noStrike">
+              <a:solidFill>
+                <a:srgbClr val="0066cc"/>
+              </a:solidFill>
+              <a:latin typeface="Arial"/>
+            </a:endParaRPr>
+          </a:p>
+          <a:p>
+            <a:pPr marL="432000" indent="-324000">
+              <a:spcBef>
+                <a:spcPts val="1417"/>
+              </a:spcBef>
+              <a:buClr>
+                <a:srgbClr val="000000"/>
+              </a:buClr>
+              <a:buSzPct val="45000"/>
+              <a:buFont typeface="Wingdings" charset="2"/>
+              <a:buChar char=""/>
+            </a:pPr>
+            <a:endParaRPr b="0" lang="en-IE" sz="3200" spc="-1" strike="noStrike">
+              <a:solidFill>
+                <a:srgbClr val="0066cc"/>
+              </a:solidFill>
+              <a:latin typeface="Arial"/>
+            </a:endParaRPr>
+          </a:p>
+          <a:p>
+            <a:pPr marL="432000" indent="-324000">
+              <a:spcBef>
+                <a:spcPts val="1417"/>
+              </a:spcBef>
+              <a:buClr>
+                <a:srgbClr val="000000"/>
+              </a:buClr>
+              <a:buSzPct val="45000"/>
+              <a:buFont typeface="Wingdings" charset="2"/>
+              <a:buChar char=""/>
+            </a:pPr>
+            <a:r>
+              <a:rPr b="0" lang="en-IE" sz="3200" spc="-1" strike="noStrike">
+                <a:solidFill>
+                  <a:srgbClr val="0066cc"/>
+                </a:solidFill>
+                <a:latin typeface="Arial"/>
+              </a:rPr>
+              <a:t>As with strings, the second number in the slice </a:t>
+            </a:r>
+            <a:r>
+              <a:rPr b="0" lang="en-IE" sz="3200" spc="-1" strike="noStrike">
+                <a:solidFill>
+                  <a:srgbClr val="0066cc"/>
+                </a:solidFill>
+                <a:latin typeface="Arial"/>
+              </a:rPr>
+              <a:t>is the last position – 1.  </a:t>
             </a:r>
             <a:endParaRPr b="0" lang="en-IE" sz="3200" spc="-1" strike="noStrike">
               <a:solidFill>
@@ -9099,7 +9226,25 @@
                 </a:solidFill>
                 <a:latin typeface="Arial"/>
               </a:rPr>
-              <a:t>Like strings, lists also have methods associated with them, accessible via the ‘.’ operator. </a:t>
+              <a:t>Like strings, lists also have methods </a:t>
+            </a:r>
+            <a:r>
+              <a:rPr b="0" lang="en-IE" sz="3200" spc="-1" strike="noStrike">
+                <a:solidFill>
+                  <a:srgbClr val="0066cc"/>
+                </a:solidFill>
+                <a:latin typeface="Arial"/>
+              </a:rPr>
+              <a:t>associated with them, accessible via the ‘.’ </a:t>
+            </a:r>
+            <a:r>
+              <a:rPr b="0" lang="en-IE" sz="3200" spc="-1" strike="noStrike">
+                <a:solidFill>
+                  <a:srgbClr val="0066cc"/>
+                </a:solidFill>
+                <a:latin typeface="Arial"/>
+              </a:rPr>
+              <a:t>operator. </a:t>
             </a:r>
             <a:endParaRPr b="0" lang="en-IE" sz="3200" spc="-1" strike="noStrike">
               <a:solidFill>
@@ -9202,7 +9347,16 @@
                 </a:solidFill>
                 <a:latin typeface="Arial"/>
               </a:rPr>
-              <a:t> method returns the last element in the list and removes it from the list. </a:t>
+              <a:t> method returns the last element in </a:t>
+            </a:r>
+            <a:r>
+              <a:rPr b="0" lang="en-IE" sz="3200" spc="-1" strike="noStrike">
+                <a:solidFill>
+                  <a:srgbClr val="0066cc"/>
+                </a:solidFill>
+                <a:latin typeface="Arial"/>
+              </a:rPr>
+              <a:t>the list and removes it from the list. </a:t>
             </a:r>
             <a:endParaRPr b="0" lang="en-IE" sz="3200" spc="-1" strike="noStrike">
               <a:solidFill>
@@ -9737,7 +9891,16 @@
                 </a:solidFill>
                 <a:latin typeface="Arial"/>
               </a:rPr>
-              <a:t>Finally, we have dictionaries, often referred to in other languages as maps. </a:t>
+              <a:t>Finally, we have dictionaries, often referred to </a:t>
+            </a:r>
+            <a:r>
+              <a:rPr b="0" lang="en-IE" sz="3200" spc="-1" strike="noStrike">
+                <a:solidFill>
+                  <a:srgbClr val="0066cc"/>
+                </a:solidFill>
+                <a:latin typeface="Arial"/>
+              </a:rPr>
+              <a:t>in other languages as maps. </a:t>
             </a:r>
             <a:endParaRPr b="0" lang="en-IE" sz="3200" spc="-1" strike="noStrike">
               <a:solidFill>
@@ -9802,7 +9965,16 @@
                 </a:solidFill>
                 <a:latin typeface="Arial"/>
               </a:rPr>
-              <a:t>Storing data in this fashion can be very useful as data lookups become very fast. </a:t>
+              <a:t>Storing data in this fashion can be very useful </a:t>
+            </a:r>
+            <a:r>
+              <a:rPr b="0" lang="en-IE" sz="3200" spc="-1" strike="noStrike">
+                <a:solidFill>
+                  <a:srgbClr val="0066cc"/>
+                </a:solidFill>
+                <a:latin typeface="Arial"/>
+              </a:rPr>
+              <a:t>as data lookups become very fast. </a:t>
             </a:r>
             <a:endParaRPr b="0" lang="en-IE" sz="3200" spc="-1" strike="noStrike">
               <a:solidFill>
@@ -10399,73 +10571,109 @@
                 </a:solidFill>
                 <a:latin typeface="Arial"/>
               </a:rPr>
-              <a:t>We can use the familiar [ ] operator to retrieve data from a dictionary.  Only instead of using an integer number as with a list, we use the key. </a:t>
-            </a:r>
-            <a:endParaRPr b="0" lang="en-IE" sz="3200" spc="-1" strike="noStrike">
-              <a:solidFill>
-                <a:srgbClr val="0066cc"/>
-              </a:solidFill>
-              <a:latin typeface="Arial"/>
-            </a:endParaRPr>
-          </a:p>
-          <a:p>
-            <a:pPr marL="432000" indent="-324000">
-              <a:spcBef>
-                <a:spcPts val="1417"/>
-              </a:spcBef>
-              <a:buClr>
-                <a:srgbClr val="000000"/>
-              </a:buClr>
-              <a:buSzPct val="45000"/>
-              <a:buFont typeface="Wingdings" charset="2"/>
-              <a:buChar char=""/>
-            </a:pPr>
-            <a:endParaRPr b="0" lang="en-IE" sz="3200" spc="-1" strike="noStrike">
-              <a:solidFill>
-                <a:srgbClr val="0066cc"/>
-              </a:solidFill>
-              <a:latin typeface="Arial"/>
-            </a:endParaRPr>
-          </a:p>
-          <a:p>
-            <a:pPr marL="432000" indent="-324000">
-              <a:spcBef>
-                <a:spcPts val="1417"/>
-              </a:spcBef>
-              <a:buClr>
-                <a:srgbClr val="000000"/>
-              </a:buClr>
-              <a:buSzPct val="45000"/>
-              <a:buFont typeface="Wingdings" charset="2"/>
-              <a:buChar char=""/>
-            </a:pPr>
-            <a:endParaRPr b="0" lang="en-IE" sz="3200" spc="-1" strike="noStrike">
-              <a:solidFill>
-                <a:srgbClr val="0066cc"/>
-              </a:solidFill>
-              <a:latin typeface="Arial"/>
-            </a:endParaRPr>
-          </a:p>
-          <a:p>
-            <a:pPr marL="432000" indent="-324000">
-              <a:spcBef>
-                <a:spcPts val="1417"/>
-              </a:spcBef>
-              <a:buClr>
-                <a:srgbClr val="000000"/>
-              </a:buClr>
-              <a:buSzPct val="45000"/>
-              <a:buFont typeface="Wingdings" charset="2"/>
-              <a:buChar char=""/>
-            </a:pPr>
-            <a:r>
-              <a:rPr b="0" lang="en-IE" sz="3200" spc="-1" strike="noStrike">
-                <a:solidFill>
-                  <a:srgbClr val="0066cc"/>
-                </a:solidFill>
-                <a:latin typeface="Arial"/>
-              </a:rPr>
-              <a:t>Note that the key can be a hardcoded string, or another Python variable. </a:t>
+              <a:t>We can use the familiar [ ] operator to retrieve </a:t>
+            </a:r>
+            <a:r>
+              <a:rPr b="0" lang="en-IE" sz="3200" spc="-1" strike="noStrike">
+                <a:solidFill>
+                  <a:srgbClr val="0066cc"/>
+                </a:solidFill>
+                <a:latin typeface="Arial"/>
+              </a:rPr>
+              <a:t>data from a dictionary.  Only instead of using </a:t>
+            </a:r>
+            <a:r>
+              <a:rPr b="0" lang="en-IE" sz="3200" spc="-1" strike="noStrike">
+                <a:solidFill>
+                  <a:srgbClr val="0066cc"/>
+                </a:solidFill>
+                <a:latin typeface="Arial"/>
+              </a:rPr>
+              <a:t>an integer number as with a list, we use the </a:t>
+            </a:r>
+            <a:r>
+              <a:rPr b="0" lang="en-IE" sz="3200" spc="-1" strike="noStrike">
+                <a:solidFill>
+                  <a:srgbClr val="0066cc"/>
+                </a:solidFill>
+                <a:latin typeface="Arial"/>
+              </a:rPr>
+              <a:t>key. </a:t>
+            </a:r>
+            <a:endParaRPr b="0" lang="en-IE" sz="3200" spc="-1" strike="noStrike">
+              <a:solidFill>
+                <a:srgbClr val="0066cc"/>
+              </a:solidFill>
+              <a:latin typeface="Arial"/>
+            </a:endParaRPr>
+          </a:p>
+          <a:p>
+            <a:pPr marL="432000" indent="-324000">
+              <a:spcBef>
+                <a:spcPts val="1417"/>
+              </a:spcBef>
+              <a:buClr>
+                <a:srgbClr val="000000"/>
+              </a:buClr>
+              <a:buSzPct val="45000"/>
+              <a:buFont typeface="Wingdings" charset="2"/>
+              <a:buChar char=""/>
+            </a:pPr>
+            <a:endParaRPr b="0" lang="en-IE" sz="3200" spc="-1" strike="noStrike">
+              <a:solidFill>
+                <a:srgbClr val="0066cc"/>
+              </a:solidFill>
+              <a:latin typeface="Arial"/>
+            </a:endParaRPr>
+          </a:p>
+          <a:p>
+            <a:pPr marL="432000" indent="-324000">
+              <a:spcBef>
+                <a:spcPts val="1417"/>
+              </a:spcBef>
+              <a:buClr>
+                <a:srgbClr val="000000"/>
+              </a:buClr>
+              <a:buSzPct val="45000"/>
+              <a:buFont typeface="Wingdings" charset="2"/>
+              <a:buChar char=""/>
+            </a:pPr>
+            <a:endParaRPr b="0" lang="en-IE" sz="3200" spc="-1" strike="noStrike">
+              <a:solidFill>
+                <a:srgbClr val="0066cc"/>
+              </a:solidFill>
+              <a:latin typeface="Arial"/>
+            </a:endParaRPr>
+          </a:p>
+          <a:p>
+            <a:pPr marL="432000" indent="-324000">
+              <a:spcBef>
+                <a:spcPts val="1417"/>
+              </a:spcBef>
+              <a:buClr>
+                <a:srgbClr val="000000"/>
+              </a:buClr>
+              <a:buSzPct val="45000"/>
+              <a:buFont typeface="Wingdings" charset="2"/>
+              <a:buChar char=""/>
+            </a:pPr>
+            <a:r>
+              <a:rPr b="0" lang="en-IE" sz="3200" spc="-1" strike="noStrike">
+                <a:solidFill>
+                  <a:srgbClr val="0066cc"/>
+                </a:solidFill>
+                <a:latin typeface="Arial"/>
+              </a:rPr>
+              <a:t>Note that the key can be a hardcoded string, or </a:t>
+            </a:r>
+            <a:r>
+              <a:rPr b="0" lang="en-IE" sz="3200" spc="-1" strike="noStrike">
+                <a:solidFill>
+                  <a:srgbClr val="0066cc"/>
+                </a:solidFill>
+                <a:latin typeface="Arial"/>
+              </a:rPr>
+              <a:t>another Python variable. </a:t>
             </a:r>
             <a:endParaRPr b="0" lang="en-IE" sz="3200" spc="-1" strike="noStrike">
               <a:solidFill>
@@ -10610,6 +10818,3163 @@
 </p:sld>
 </file>
 
+<file path=ppt/slides/slide31.xml><?xml version="1.0" encoding="utf-8"?>
+<p:sld xmlns:a="http://schemas.openxmlformats.org/drawingml/2006/main" xmlns:p="http://schemas.openxmlformats.org/presentationml/2006/main" xmlns:r="http://schemas.openxmlformats.org/officeDocument/2006/relationships" xmlns:p14="http://schemas.microsoft.com/office/powerpoint/2010/main" xmlns:p15="http://schemas.microsoft.com/office/powerpoint/2012/main" xmlns:mc="http://schemas.openxmlformats.org/markup-compatibility/2006">
+  <p:cSld>
+    <p:spTree>
+      <p:nvGrpSpPr>
+        <p:cNvPr id="1" name=""/>
+        <p:cNvGrpSpPr/>
+        <p:nvPr/>
+      </p:nvGrpSpPr>
+      <p:grpSpPr>
+        <a:xfrm>
+          <a:off x="0" y="0"/>
+          <a:ext cx="0" cy="0"/>
+          <a:chOff x="0" y="0"/>
+          <a:chExt cx="0" cy="0"/>
+        </a:xfrm>
+      </p:grpSpPr>
+      <p:sp>
+        <p:nvSpPr>
+          <p:cNvPr id="159" name="TextShape 1"/>
+          <p:cNvSpPr txBox="1"/>
+          <p:nvPr/>
+        </p:nvSpPr>
+        <p:spPr>
+          <a:xfrm>
+            <a:off x="504000" y="301320"/>
+            <a:ext cx="9071640" cy="637560"/>
+          </a:xfrm>
+          <a:prstGeom prst="rect">
+            <a:avLst/>
+          </a:prstGeom>
+          <a:noFill/>
+          <a:ln>
+            <a:noFill/>
+          </a:ln>
+        </p:spPr>
+        <p:txBody>
+          <a:bodyPr lIns="0" rIns="0" tIns="0" bIns="0" anchor="ctr"/>
+          <a:p>
+            <a:pPr algn="ctr"/>
+            <a:r>
+              <a:rPr b="0" lang="en-IE" sz="4400" spc="-1" strike="noStrike">
+                <a:solidFill>
+                  <a:srgbClr val="ffffff"/>
+                </a:solidFill>
+                <a:latin typeface="Arial"/>
+              </a:rPr>
+              <a:t>Introduction to Python</a:t>
+            </a:r>
+            <a:endParaRPr b="0" lang="en-IE" sz="4400" spc="-1" strike="noStrike">
+              <a:solidFill>
+                <a:srgbClr val="ffffff"/>
+              </a:solidFill>
+              <a:latin typeface="Arial"/>
+            </a:endParaRPr>
+          </a:p>
+        </p:txBody>
+      </p:sp>
+      <p:sp>
+        <p:nvSpPr>
+          <p:cNvPr id="160" name="TextShape 2"/>
+          <p:cNvSpPr txBox="1"/>
+          <p:nvPr/>
+        </p:nvSpPr>
+        <p:spPr>
+          <a:xfrm>
+            <a:off x="504000" y="1769040"/>
+            <a:ext cx="9071640" cy="4384440"/>
+          </a:xfrm>
+          <a:prstGeom prst="rect">
+            <a:avLst/>
+          </a:prstGeom>
+          <a:noFill/>
+          <a:ln>
+            <a:noFill/>
+          </a:ln>
+        </p:spPr>
+        <p:txBody>
+          <a:bodyPr lIns="0" rIns="0" tIns="0" bIns="0"/>
+          <a:p>
+            <a:pPr marL="432000" indent="-324000">
+              <a:spcBef>
+                <a:spcPts val="1417"/>
+              </a:spcBef>
+              <a:buClr>
+                <a:srgbClr val="000000"/>
+              </a:buClr>
+              <a:buSzPct val="45000"/>
+              <a:buFont typeface="Wingdings" charset="2"/>
+              <a:buChar char=""/>
+            </a:pPr>
+            <a:r>
+              <a:rPr b="0" lang="en-IE" sz="3200" spc="-1" strike="noStrike">
+                <a:solidFill>
+                  <a:srgbClr val="0066cc"/>
+                </a:solidFill>
+                <a:latin typeface="Arial"/>
+              </a:rPr>
+              <a:t>We can use the familiar [ ] operator to retrieve </a:t>
+            </a:r>
+            <a:r>
+              <a:rPr b="0" lang="en-IE" sz="3200" spc="-1" strike="noStrike">
+                <a:solidFill>
+                  <a:srgbClr val="0066cc"/>
+                </a:solidFill>
+                <a:latin typeface="Arial"/>
+              </a:rPr>
+              <a:t>data from a dictionary.  Only instead of using </a:t>
+            </a:r>
+            <a:r>
+              <a:rPr b="0" lang="en-IE" sz="3200" spc="-1" strike="noStrike">
+                <a:solidFill>
+                  <a:srgbClr val="0066cc"/>
+                </a:solidFill>
+                <a:latin typeface="Arial"/>
+              </a:rPr>
+              <a:t>an integer number as with a list, we use the </a:t>
+            </a:r>
+            <a:r>
+              <a:rPr b="0" lang="en-IE" sz="3200" spc="-1" strike="noStrike">
+                <a:solidFill>
+                  <a:srgbClr val="0066cc"/>
+                </a:solidFill>
+                <a:latin typeface="Arial"/>
+              </a:rPr>
+              <a:t>key. </a:t>
+            </a:r>
+            <a:endParaRPr b="0" lang="en-IE" sz="3200" spc="-1" strike="noStrike">
+              <a:solidFill>
+                <a:srgbClr val="0066cc"/>
+              </a:solidFill>
+              <a:latin typeface="Arial"/>
+            </a:endParaRPr>
+          </a:p>
+          <a:p>
+            <a:pPr marL="432000" indent="-324000">
+              <a:spcBef>
+                <a:spcPts val="1417"/>
+              </a:spcBef>
+              <a:buClr>
+                <a:srgbClr val="000000"/>
+              </a:buClr>
+              <a:buSzPct val="45000"/>
+              <a:buFont typeface="Wingdings" charset="2"/>
+              <a:buChar char=""/>
+            </a:pPr>
+            <a:endParaRPr b="0" lang="en-IE" sz="3200" spc="-1" strike="noStrike">
+              <a:solidFill>
+                <a:srgbClr val="0066cc"/>
+              </a:solidFill>
+              <a:latin typeface="Arial"/>
+            </a:endParaRPr>
+          </a:p>
+          <a:p>
+            <a:pPr marL="432000" indent="-324000">
+              <a:spcBef>
+                <a:spcPts val="1417"/>
+              </a:spcBef>
+              <a:buClr>
+                <a:srgbClr val="000000"/>
+              </a:buClr>
+              <a:buSzPct val="45000"/>
+              <a:buFont typeface="Wingdings" charset="2"/>
+              <a:buChar char=""/>
+            </a:pPr>
+            <a:endParaRPr b="0" lang="en-IE" sz="3200" spc="-1" strike="noStrike">
+              <a:solidFill>
+                <a:srgbClr val="0066cc"/>
+              </a:solidFill>
+              <a:latin typeface="Arial"/>
+            </a:endParaRPr>
+          </a:p>
+          <a:p>
+            <a:pPr marL="432000" indent="-324000">
+              <a:spcBef>
+                <a:spcPts val="1417"/>
+              </a:spcBef>
+              <a:buClr>
+                <a:srgbClr val="000000"/>
+              </a:buClr>
+              <a:buSzPct val="45000"/>
+              <a:buFont typeface="Wingdings" charset="2"/>
+              <a:buChar char=""/>
+            </a:pPr>
+            <a:r>
+              <a:rPr b="0" lang="en-IE" sz="3200" spc="-1" strike="noStrike">
+                <a:solidFill>
+                  <a:srgbClr val="0066cc"/>
+                </a:solidFill>
+                <a:latin typeface="Arial"/>
+              </a:rPr>
+              <a:t>The output of this is a list of the keys for this </a:t>
+            </a:r>
+            <a:r>
+              <a:rPr b="0" lang="en-IE" sz="3200" spc="-1" strike="noStrike">
+                <a:solidFill>
+                  <a:srgbClr val="0066cc"/>
+                </a:solidFill>
+                <a:latin typeface="Arial"/>
+              </a:rPr>
+              <a:t>dictionary. </a:t>
+            </a:r>
+            <a:endParaRPr b="0" lang="en-IE" sz="3200" spc="-1" strike="noStrike">
+              <a:solidFill>
+                <a:srgbClr val="0066cc"/>
+              </a:solidFill>
+              <a:latin typeface="Arial"/>
+            </a:endParaRPr>
+          </a:p>
+          <a:p>
+            <a:pPr marL="432000" indent="-324000">
+              <a:spcBef>
+                <a:spcPts val="1417"/>
+              </a:spcBef>
+              <a:buClr>
+                <a:srgbClr val="000000"/>
+              </a:buClr>
+              <a:buSzPct val="45000"/>
+              <a:buFont typeface="Wingdings" charset="2"/>
+              <a:buChar char=""/>
+            </a:pPr>
+            <a:endParaRPr b="0" lang="en-IE" sz="3200" spc="-1" strike="noStrike">
+              <a:solidFill>
+                <a:srgbClr val="0066cc"/>
+              </a:solidFill>
+              <a:latin typeface="Arial"/>
+            </a:endParaRPr>
+          </a:p>
+        </p:txBody>
+      </p:sp>
+      <p:graphicFrame>
+        <p:nvGraphicFramePr>
+          <p:cNvPr id="161" name="Table 3"/>
+          <p:cNvGraphicFramePr/>
+          <p:nvPr/>
+        </p:nvGraphicFramePr>
+        <p:xfrm>
+          <a:off x="723240" y="3256200"/>
+          <a:ext cx="5075280" cy="719280"/>
+        </p:xfrm>
+        <a:graphic>
+          <a:graphicData uri="http://schemas.openxmlformats.org/drawingml/2006/table">
+            <a:tbl>
+              <a:tblPr/>
+              <a:tblGrid>
+                <a:gridCol w="5075640"/>
+              </a:tblGrid>
+              <a:tr h="457560">
+                <a:tc>
+                  <a:txBody>
+                    <a:bodyPr lIns="90000" rIns="90000" tIns="46800" bIns="46800"/>
+                    <a:p>
+                      <a:r>
+                        <a:rPr b="0" lang="en-IE" sz="1800" spc="-1" strike="noStrike">
+                          <a:latin typeface="Courier New"/>
+                        </a:rPr>
+                        <a:t>print (d1.keys())</a:t>
+                      </a:r>
+                      <a:endParaRPr b="0" lang="en-IE" sz="1800" spc="-1" strike="noStrike">
+                        <a:latin typeface="Courier New"/>
+                      </a:endParaRPr>
+                    </a:p>
+                  </a:txBody>
+                  <a:tcPr marL="90000" marR="90000">
+                    <a:lnL w="720">
+                      <a:solidFill>
+                        <a:srgbClr val="ffffff"/>
+                      </a:solidFill>
+                    </a:lnL>
+                    <a:lnR w="720">
+                      <a:solidFill>
+                        <a:srgbClr val="ffffff"/>
+                      </a:solidFill>
+                    </a:lnR>
+                    <a:lnT w="720">
+                      <a:solidFill>
+                        <a:srgbClr val="ffffff"/>
+                      </a:solidFill>
+                    </a:lnT>
+                    <a:lnB w="720">
+                      <a:solidFill>
+                        <a:srgbClr val="ffffff"/>
+                      </a:solidFill>
+                    </a:lnB>
+                    <a:solidFill>
+                      <a:srgbClr val="b3b3b3"/>
+                    </a:solidFill>
+                  </a:tcPr>
+                </a:tc>
+              </a:tr>
+            </a:tbl>
+          </a:graphicData>
+        </a:graphic>
+      </p:graphicFrame>
+    </p:spTree>
+  </p:cSld>
+  <p:timing>
+    <p:tnLst>
+      <p:par>
+        <p:cTn id="61" dur="indefinite" restart="never" nodeType="tmRoot">
+          <p:childTnLst>
+            <p:seq>
+              <p:cTn id="62" dur="indefinite" nodeType="mainSeq"/>
+              <p:prevCondLst>
+                <p:cond delay="0" evt="onPrev">
+                  <p:tgtEl>
+                    <p:sldTgt/>
+                  </p:tgtEl>
+                </p:cond>
+              </p:prevCondLst>
+              <p:nextCondLst>
+                <p:cond delay="0" evt="onNext">
+                  <p:tgtEl>
+                    <p:sldTgt/>
+                  </p:tgtEl>
+                </p:cond>
+              </p:nextCondLst>
+            </p:seq>
+          </p:childTnLst>
+        </p:cTn>
+      </p:par>
+    </p:tnLst>
+  </p:timing>
+</p:sld>
+</file>
+
+<file path=ppt/slides/slide32.xml><?xml version="1.0" encoding="utf-8"?>
+<p:sld xmlns:a="http://schemas.openxmlformats.org/drawingml/2006/main" xmlns:p="http://schemas.openxmlformats.org/presentationml/2006/main" xmlns:r="http://schemas.openxmlformats.org/officeDocument/2006/relationships" xmlns:p14="http://schemas.microsoft.com/office/powerpoint/2010/main" xmlns:p15="http://schemas.microsoft.com/office/powerpoint/2012/main" xmlns:mc="http://schemas.openxmlformats.org/markup-compatibility/2006">
+  <p:cSld>
+    <p:spTree>
+      <p:nvGrpSpPr>
+        <p:cNvPr id="1" name=""/>
+        <p:cNvGrpSpPr/>
+        <p:nvPr/>
+      </p:nvGrpSpPr>
+      <p:grpSpPr>
+        <a:xfrm>
+          <a:off x="0" y="0"/>
+          <a:ext cx="0" cy="0"/>
+          <a:chOff x="0" y="0"/>
+          <a:chExt cx="0" cy="0"/>
+        </a:xfrm>
+      </p:grpSpPr>
+      <p:sp>
+        <p:nvSpPr>
+          <p:cNvPr id="162" name="TextShape 1"/>
+          <p:cNvSpPr txBox="1"/>
+          <p:nvPr/>
+        </p:nvSpPr>
+        <p:spPr>
+          <a:xfrm>
+            <a:off x="504000" y="301320"/>
+            <a:ext cx="9071640" cy="637560"/>
+          </a:xfrm>
+          <a:prstGeom prst="rect">
+            <a:avLst/>
+          </a:prstGeom>
+          <a:noFill/>
+          <a:ln>
+            <a:noFill/>
+          </a:ln>
+        </p:spPr>
+        <p:txBody>
+          <a:bodyPr lIns="0" rIns="0" tIns="0" bIns="0" anchor="ctr"/>
+          <a:p>
+            <a:pPr algn="ctr"/>
+            <a:r>
+              <a:rPr b="0" lang="en-IE" sz="4400" spc="-1" strike="noStrike">
+                <a:solidFill>
+                  <a:srgbClr val="ffffff"/>
+                </a:solidFill>
+                <a:latin typeface="Arial"/>
+              </a:rPr>
+              <a:t>Introduction to Python</a:t>
+            </a:r>
+            <a:endParaRPr b="0" lang="en-IE" sz="4400" spc="-1" strike="noStrike">
+              <a:solidFill>
+                <a:srgbClr val="ffffff"/>
+              </a:solidFill>
+              <a:latin typeface="Arial"/>
+            </a:endParaRPr>
+          </a:p>
+        </p:txBody>
+      </p:sp>
+      <p:sp>
+        <p:nvSpPr>
+          <p:cNvPr id="163" name="TextShape 2"/>
+          <p:cNvSpPr txBox="1"/>
+          <p:nvPr/>
+        </p:nvSpPr>
+        <p:spPr>
+          <a:xfrm>
+            <a:off x="504000" y="1769040"/>
+            <a:ext cx="9071640" cy="4384440"/>
+          </a:xfrm>
+          <a:prstGeom prst="rect">
+            <a:avLst/>
+          </a:prstGeom>
+          <a:noFill/>
+          <a:ln>
+            <a:noFill/>
+          </a:ln>
+        </p:spPr>
+        <p:txBody>
+          <a:bodyPr lIns="0" rIns="0" tIns="0" bIns="0"/>
+          <a:p>
+            <a:pPr marL="432000" indent="-324000">
+              <a:spcBef>
+                <a:spcPts val="1417"/>
+              </a:spcBef>
+              <a:buClr>
+                <a:srgbClr val="000000"/>
+              </a:buClr>
+              <a:buSzPct val="45000"/>
+              <a:buFont typeface="Wingdings" charset="2"/>
+              <a:buChar char=""/>
+            </a:pPr>
+            <a:r>
+              <a:rPr b="0" lang="en-IE" sz="3200" spc="-1" strike="noStrike">
+                <a:solidFill>
+                  <a:srgbClr val="0066cc"/>
+                </a:solidFill>
+                <a:latin typeface="Arial"/>
+              </a:rPr>
+              <a:t>Python has the </a:t>
+            </a:r>
+            <a:r>
+              <a:rPr b="0" i="1" lang="en-IE" sz="3200" spc="-1" strike="noStrike">
+                <a:solidFill>
+                  <a:srgbClr val="0066cc"/>
+                </a:solidFill>
+                <a:latin typeface="Arial"/>
+              </a:rPr>
+              <a:t>if</a:t>
+            </a:r>
+            <a:r>
+              <a:rPr b="0" lang="en-IE" sz="3200" spc="-1" strike="noStrike">
+                <a:solidFill>
+                  <a:srgbClr val="0066cc"/>
+                </a:solidFill>
+                <a:latin typeface="Arial"/>
+              </a:rPr>
+              <a:t> statement to allow us to make decisions about what to do in our programs. </a:t>
+            </a:r>
+            <a:r>
+              <a:rPr b="0" lang="en-IE" sz="3200" spc="-1" strike="noStrike">
+                <a:solidFill>
+                  <a:srgbClr val="0066cc"/>
+                </a:solidFill>
+                <a:latin typeface="Arial"/>
+              </a:rPr>
+              <a:t> </a:t>
+            </a:r>
+            <a:endParaRPr b="0" lang="en-IE" sz="3200" spc="-1" strike="noStrike">
+              <a:solidFill>
+                <a:srgbClr val="0066cc"/>
+              </a:solidFill>
+              <a:latin typeface="Arial"/>
+            </a:endParaRPr>
+          </a:p>
+          <a:p>
+            <a:pPr marL="432000" indent="-324000">
+              <a:spcBef>
+                <a:spcPts val="1417"/>
+              </a:spcBef>
+              <a:buClr>
+                <a:srgbClr val="000000"/>
+              </a:buClr>
+              <a:buSzPct val="45000"/>
+              <a:buFont typeface="Wingdings" charset="2"/>
+              <a:buChar char=""/>
+            </a:pPr>
+            <a:endParaRPr b="0" lang="en-IE" sz="3200" spc="-1" strike="noStrike">
+              <a:solidFill>
+                <a:srgbClr val="0066cc"/>
+              </a:solidFill>
+              <a:latin typeface="Arial"/>
+            </a:endParaRPr>
+          </a:p>
+          <a:p>
+            <a:pPr marL="432000" indent="-324000">
+              <a:spcBef>
+                <a:spcPts val="1417"/>
+              </a:spcBef>
+              <a:buClr>
+                <a:srgbClr val="000000"/>
+              </a:buClr>
+              <a:buSzPct val="45000"/>
+              <a:buFont typeface="Wingdings" charset="2"/>
+              <a:buChar char=""/>
+            </a:pPr>
+            <a:endParaRPr b="0" lang="en-IE" sz="3200" spc="-1" strike="noStrike">
+              <a:solidFill>
+                <a:srgbClr val="0066cc"/>
+              </a:solidFill>
+              <a:latin typeface="Arial"/>
+            </a:endParaRPr>
+          </a:p>
+          <a:p>
+            <a:pPr marL="432000" indent="-324000">
+              <a:spcBef>
+                <a:spcPts val="1417"/>
+              </a:spcBef>
+              <a:buClr>
+                <a:srgbClr val="000000"/>
+              </a:buClr>
+              <a:buSzPct val="45000"/>
+              <a:buFont typeface="Wingdings" charset="2"/>
+              <a:buChar char=""/>
+            </a:pPr>
+            <a:endParaRPr b="0" lang="en-IE" sz="3200" spc="-1" strike="noStrike">
+              <a:solidFill>
+                <a:srgbClr val="0066cc"/>
+              </a:solidFill>
+              <a:latin typeface="Arial"/>
+            </a:endParaRPr>
+          </a:p>
+          <a:p>
+            <a:pPr marL="432000" indent="-324000">
+              <a:spcBef>
+                <a:spcPts val="1417"/>
+              </a:spcBef>
+              <a:buClr>
+                <a:srgbClr val="000000"/>
+              </a:buClr>
+              <a:buSzPct val="45000"/>
+              <a:buFont typeface="Wingdings" charset="2"/>
+              <a:buChar char=""/>
+            </a:pPr>
+            <a:endParaRPr b="0" lang="en-IE" sz="3200" spc="-1" strike="noStrike">
+              <a:solidFill>
+                <a:srgbClr val="0066cc"/>
+              </a:solidFill>
+              <a:latin typeface="Arial"/>
+            </a:endParaRPr>
+          </a:p>
+          <a:p>
+            <a:pPr marL="432000" indent="-324000">
+              <a:spcBef>
+                <a:spcPts val="1417"/>
+              </a:spcBef>
+              <a:buClr>
+                <a:srgbClr val="000000"/>
+              </a:buClr>
+              <a:buSzPct val="45000"/>
+              <a:buFont typeface="Wingdings" charset="2"/>
+              <a:buChar char=""/>
+            </a:pPr>
+            <a:r>
+              <a:rPr b="0" lang="en-IE" sz="3200" spc="-1" strike="noStrike">
+                <a:solidFill>
+                  <a:srgbClr val="0066cc"/>
+                </a:solidFill>
+                <a:latin typeface="Arial"/>
+              </a:rPr>
+              <a:t>Note that Python uses indentation to delimit the start and end of an if/else block. </a:t>
+            </a:r>
+            <a:endParaRPr b="0" lang="en-IE" sz="3200" spc="-1" strike="noStrike">
+              <a:solidFill>
+                <a:srgbClr val="0066cc"/>
+              </a:solidFill>
+              <a:latin typeface="Arial"/>
+            </a:endParaRPr>
+          </a:p>
+        </p:txBody>
+      </p:sp>
+      <p:graphicFrame>
+        <p:nvGraphicFramePr>
+          <p:cNvPr id="164" name="Table 3"/>
+          <p:cNvGraphicFramePr/>
+          <p:nvPr/>
+        </p:nvGraphicFramePr>
+        <p:xfrm>
+          <a:off x="723240" y="3040200"/>
+          <a:ext cx="5075280" cy="719280"/>
+        </p:xfrm>
+        <a:graphic>
+          <a:graphicData uri="http://schemas.openxmlformats.org/drawingml/2006/table">
+            <a:tbl>
+              <a:tblPr/>
+              <a:tblGrid>
+                <a:gridCol w="5075640"/>
+              </a:tblGrid>
+              <a:tr h="457560">
+                <a:tc>
+                  <a:txBody>
+                    <a:bodyPr lIns="90000" rIns="90000" tIns="46800" bIns="46800"/>
+                    <a:p>
+                      <a:r>
+                        <a:rPr b="0" lang="en-IE" sz="1800" spc="-1" strike="noStrike">
+                          <a:latin typeface="Courier New"/>
+                        </a:rPr>
+                        <a:t>x = 5</a:t>
+                      </a:r>
+                      <a:endParaRPr b="0" lang="en-IE" sz="1800" spc="-1" strike="noStrike">
+                        <a:latin typeface="Courier New"/>
+                      </a:endParaRPr>
+                    </a:p>
+                    <a:p>
+                      <a:r>
+                        <a:rPr b="0" lang="en-IE" sz="1800" spc="-1" strike="noStrike">
+                          <a:latin typeface="Courier New"/>
+                        </a:rPr>
+                        <a:t>if x == 5:</a:t>
+                      </a:r>
+                      <a:endParaRPr b="0" lang="en-IE" sz="1800" spc="-1" strike="noStrike">
+                        <a:latin typeface="Courier New"/>
+                      </a:endParaRPr>
+                    </a:p>
+                    <a:p>
+                      <a:r>
+                        <a:rPr b="0" lang="en-IE" sz="1800" spc="-1" strike="noStrike">
+                          <a:latin typeface="Courier New"/>
+                        </a:rPr>
+                        <a:t>   </a:t>
+                      </a:r>
+                      <a:r>
+                        <a:rPr b="0" lang="en-IE" sz="1800" spc="-1" strike="noStrike">
+                          <a:latin typeface="Courier New"/>
+                        </a:rPr>
+                        <a:t>print (‘x is 5’)</a:t>
+                      </a:r>
+                      <a:endParaRPr b="0" lang="en-IE" sz="1800" spc="-1" strike="noStrike">
+                        <a:latin typeface="Courier New"/>
+                      </a:endParaRPr>
+                    </a:p>
+                    <a:p>
+                      <a:r>
+                        <a:rPr b="0" lang="en-IE" sz="1800" spc="-1" strike="noStrike">
+                          <a:latin typeface="Courier New"/>
+                        </a:rPr>
+                        <a:t>else:</a:t>
+                      </a:r>
+                      <a:endParaRPr b="0" lang="en-IE" sz="1800" spc="-1" strike="noStrike">
+                        <a:latin typeface="Courier New"/>
+                      </a:endParaRPr>
+                    </a:p>
+                    <a:p>
+                      <a:r>
+                        <a:rPr b="0" lang="en-IE" sz="1800" spc="-1" strike="noStrike">
+                          <a:latin typeface="Courier New"/>
+                        </a:rPr>
+                        <a:t>   </a:t>
+                      </a:r>
+                      <a:r>
+                        <a:rPr b="0" lang="en-IE" sz="1800" spc="-1" strike="noStrike">
+                          <a:latin typeface="Courier New"/>
+                        </a:rPr>
+                        <a:t>print (‘x is not 5’)</a:t>
+                      </a:r>
+                      <a:endParaRPr b="0" lang="en-IE" sz="1800" spc="-1" strike="noStrike">
+                        <a:latin typeface="Courier New"/>
+                      </a:endParaRPr>
+                    </a:p>
+                  </a:txBody>
+                  <a:tcPr marL="90000" marR="90000">
+                    <a:lnL w="720">
+                      <a:solidFill>
+                        <a:srgbClr val="ffffff"/>
+                      </a:solidFill>
+                    </a:lnL>
+                    <a:lnR w="720">
+                      <a:solidFill>
+                        <a:srgbClr val="ffffff"/>
+                      </a:solidFill>
+                    </a:lnR>
+                    <a:lnT w="720">
+                      <a:solidFill>
+                        <a:srgbClr val="ffffff"/>
+                      </a:solidFill>
+                    </a:lnT>
+                    <a:lnB w="720">
+                      <a:solidFill>
+                        <a:srgbClr val="ffffff"/>
+                      </a:solidFill>
+                    </a:lnB>
+                    <a:solidFill>
+                      <a:srgbClr val="b3b3b3"/>
+                    </a:solidFill>
+                  </a:tcPr>
+                </a:tc>
+              </a:tr>
+            </a:tbl>
+          </a:graphicData>
+        </a:graphic>
+      </p:graphicFrame>
+    </p:spTree>
+  </p:cSld>
+  <p:timing>
+    <p:tnLst>
+      <p:par>
+        <p:cTn id="63" dur="indefinite" restart="never" nodeType="tmRoot">
+          <p:childTnLst>
+            <p:seq>
+              <p:cTn id="64" dur="indefinite" nodeType="mainSeq"/>
+              <p:prevCondLst>
+                <p:cond delay="0" evt="onPrev">
+                  <p:tgtEl>
+                    <p:sldTgt/>
+                  </p:tgtEl>
+                </p:cond>
+              </p:prevCondLst>
+              <p:nextCondLst>
+                <p:cond delay="0" evt="onNext">
+                  <p:tgtEl>
+                    <p:sldTgt/>
+                  </p:tgtEl>
+                </p:cond>
+              </p:nextCondLst>
+            </p:seq>
+          </p:childTnLst>
+        </p:cTn>
+      </p:par>
+    </p:tnLst>
+  </p:timing>
+</p:sld>
+</file>
+
+<file path=ppt/slides/slide33.xml><?xml version="1.0" encoding="utf-8"?>
+<p:sld xmlns:a="http://schemas.openxmlformats.org/drawingml/2006/main" xmlns:p="http://schemas.openxmlformats.org/presentationml/2006/main" xmlns:r="http://schemas.openxmlformats.org/officeDocument/2006/relationships" xmlns:p14="http://schemas.microsoft.com/office/powerpoint/2010/main" xmlns:p15="http://schemas.microsoft.com/office/powerpoint/2012/main" xmlns:mc="http://schemas.openxmlformats.org/markup-compatibility/2006">
+  <p:cSld>
+    <p:spTree>
+      <p:nvGrpSpPr>
+        <p:cNvPr id="1" name=""/>
+        <p:cNvGrpSpPr/>
+        <p:nvPr/>
+      </p:nvGrpSpPr>
+      <p:grpSpPr>
+        <a:xfrm>
+          <a:off x="0" y="0"/>
+          <a:ext cx="0" cy="0"/>
+          <a:chOff x="0" y="0"/>
+          <a:chExt cx="0" cy="0"/>
+        </a:xfrm>
+      </p:grpSpPr>
+      <p:sp>
+        <p:nvSpPr>
+          <p:cNvPr id="165" name="TextShape 1"/>
+          <p:cNvSpPr txBox="1"/>
+          <p:nvPr/>
+        </p:nvSpPr>
+        <p:spPr>
+          <a:xfrm>
+            <a:off x="504000" y="301320"/>
+            <a:ext cx="9071640" cy="637560"/>
+          </a:xfrm>
+          <a:prstGeom prst="rect">
+            <a:avLst/>
+          </a:prstGeom>
+          <a:noFill/>
+          <a:ln>
+            <a:noFill/>
+          </a:ln>
+        </p:spPr>
+        <p:txBody>
+          <a:bodyPr lIns="0" rIns="0" tIns="0" bIns="0" anchor="ctr"/>
+          <a:p>
+            <a:pPr algn="ctr"/>
+            <a:r>
+              <a:rPr b="0" lang="en-IE" sz="4400" spc="-1" strike="noStrike">
+                <a:solidFill>
+                  <a:srgbClr val="ffffff"/>
+                </a:solidFill>
+                <a:latin typeface="Arial"/>
+              </a:rPr>
+              <a:t>Introduction to Python</a:t>
+            </a:r>
+            <a:endParaRPr b="0" lang="en-IE" sz="4400" spc="-1" strike="noStrike">
+              <a:solidFill>
+                <a:srgbClr val="ffffff"/>
+              </a:solidFill>
+              <a:latin typeface="Arial"/>
+            </a:endParaRPr>
+          </a:p>
+        </p:txBody>
+      </p:sp>
+      <p:sp>
+        <p:nvSpPr>
+          <p:cNvPr id="166" name="TextShape 2"/>
+          <p:cNvSpPr txBox="1"/>
+          <p:nvPr/>
+        </p:nvSpPr>
+        <p:spPr>
+          <a:xfrm>
+            <a:off x="504000" y="1769040"/>
+            <a:ext cx="9071640" cy="4384440"/>
+          </a:xfrm>
+          <a:prstGeom prst="rect">
+            <a:avLst/>
+          </a:prstGeom>
+          <a:noFill/>
+          <a:ln>
+            <a:noFill/>
+          </a:ln>
+        </p:spPr>
+        <p:txBody>
+          <a:bodyPr lIns="0" rIns="0" tIns="0" bIns="0"/>
+          <a:p>
+            <a:pPr marL="432000" indent="-324000">
+              <a:spcBef>
+                <a:spcPts val="1417"/>
+              </a:spcBef>
+              <a:buClr>
+                <a:srgbClr val="000000"/>
+              </a:buClr>
+              <a:buSzPct val="45000"/>
+              <a:buFont typeface="Wingdings" charset="2"/>
+              <a:buChar char=""/>
+            </a:pPr>
+            <a:r>
+              <a:rPr b="0" lang="en-IE" sz="3200" spc="-1" strike="noStrike">
+                <a:solidFill>
+                  <a:srgbClr val="0066cc"/>
+                </a:solidFill>
+                <a:latin typeface="Arial"/>
+              </a:rPr>
+              <a:t>Python also allows the use of one or more elif statements in an if/else block.</a:t>
+            </a:r>
+            <a:endParaRPr b="0" lang="en-IE" sz="3200" spc="-1" strike="noStrike">
+              <a:solidFill>
+                <a:srgbClr val="0066cc"/>
+              </a:solidFill>
+              <a:latin typeface="Arial"/>
+            </a:endParaRPr>
+          </a:p>
+          <a:p>
+            <a:pPr marL="432000" indent="-324000">
+              <a:spcBef>
+                <a:spcPts val="1417"/>
+              </a:spcBef>
+              <a:buClr>
+                <a:srgbClr val="000000"/>
+              </a:buClr>
+              <a:buSzPct val="45000"/>
+              <a:buFont typeface="Wingdings" charset="2"/>
+              <a:buChar char=""/>
+            </a:pPr>
+            <a:endParaRPr b="0" lang="en-IE" sz="3200" spc="-1" strike="noStrike">
+              <a:solidFill>
+                <a:srgbClr val="0066cc"/>
+              </a:solidFill>
+              <a:latin typeface="Arial"/>
+            </a:endParaRPr>
+          </a:p>
+          <a:p>
+            <a:pPr marL="432000" indent="-324000">
+              <a:spcBef>
+                <a:spcPts val="1417"/>
+              </a:spcBef>
+              <a:buClr>
+                <a:srgbClr val="000000"/>
+              </a:buClr>
+              <a:buSzPct val="45000"/>
+              <a:buFont typeface="Wingdings" charset="2"/>
+              <a:buChar char=""/>
+            </a:pPr>
+            <a:endParaRPr b="0" lang="en-IE" sz="3200" spc="-1" strike="noStrike">
+              <a:solidFill>
+                <a:srgbClr val="0066cc"/>
+              </a:solidFill>
+              <a:latin typeface="Arial"/>
+            </a:endParaRPr>
+          </a:p>
+          <a:p>
+            <a:pPr marL="432000" indent="-324000">
+              <a:spcBef>
+                <a:spcPts val="1417"/>
+              </a:spcBef>
+              <a:buClr>
+                <a:srgbClr val="000000"/>
+              </a:buClr>
+              <a:buSzPct val="45000"/>
+              <a:buFont typeface="Wingdings" charset="2"/>
+              <a:buChar char=""/>
+            </a:pPr>
+            <a:endParaRPr b="0" lang="en-IE" sz="3200" spc="-1" strike="noStrike">
+              <a:solidFill>
+                <a:srgbClr val="0066cc"/>
+              </a:solidFill>
+              <a:latin typeface="Arial"/>
+            </a:endParaRPr>
+          </a:p>
+          <a:p>
+            <a:pPr marL="432000" indent="-324000">
+              <a:spcBef>
+                <a:spcPts val="1417"/>
+              </a:spcBef>
+              <a:buClr>
+                <a:srgbClr val="000000"/>
+              </a:buClr>
+              <a:buSzPct val="45000"/>
+              <a:buFont typeface="Wingdings" charset="2"/>
+              <a:buChar char=""/>
+            </a:pPr>
+            <a:endParaRPr b="0" lang="en-IE" sz="3200" spc="-1" strike="noStrike">
+              <a:solidFill>
+                <a:srgbClr val="0066cc"/>
+              </a:solidFill>
+              <a:latin typeface="Arial"/>
+            </a:endParaRPr>
+          </a:p>
+        </p:txBody>
+      </p:sp>
+      <p:graphicFrame>
+        <p:nvGraphicFramePr>
+          <p:cNvPr id="167" name="Table 3"/>
+          <p:cNvGraphicFramePr/>
+          <p:nvPr/>
+        </p:nvGraphicFramePr>
+        <p:xfrm>
+          <a:off x="723240" y="3040200"/>
+          <a:ext cx="5075280" cy="719280"/>
+        </p:xfrm>
+        <a:graphic>
+          <a:graphicData uri="http://schemas.openxmlformats.org/drawingml/2006/table">
+            <a:tbl>
+              <a:tblPr/>
+              <a:tblGrid>
+                <a:gridCol w="5075640"/>
+              </a:tblGrid>
+              <a:tr h="457560">
+                <a:tc>
+                  <a:txBody>
+                    <a:bodyPr lIns="90000" rIns="90000" tIns="46800" bIns="46800"/>
+                    <a:p>
+                      <a:r>
+                        <a:rPr b="0" lang="en-IE" sz="1800" spc="-1" strike="noStrike">
+                          <a:latin typeface="Courier New"/>
+                        </a:rPr>
+                        <a:t>x = 5</a:t>
+                      </a:r>
+                      <a:endParaRPr b="0" lang="en-IE" sz="1800" spc="-1" strike="noStrike">
+                        <a:latin typeface="Courier New"/>
+                      </a:endParaRPr>
+                    </a:p>
+                    <a:p>
+                      <a:r>
+                        <a:rPr b="0" lang="en-IE" sz="1800" spc="-1" strike="noStrike">
+                          <a:latin typeface="Courier New"/>
+                        </a:rPr>
+                        <a:t>if x == 5:</a:t>
+                      </a:r>
+                      <a:endParaRPr b="0" lang="en-IE" sz="1800" spc="-1" strike="noStrike">
+                        <a:latin typeface="Courier New"/>
+                      </a:endParaRPr>
+                    </a:p>
+                    <a:p>
+                      <a:r>
+                        <a:rPr b="0" lang="en-IE" sz="1800" spc="-1" strike="noStrike">
+                          <a:latin typeface="Courier New"/>
+                        </a:rPr>
+                        <a:t>   </a:t>
+                      </a:r>
+                      <a:r>
+                        <a:rPr b="0" lang="en-IE" sz="1800" spc="-1" strike="noStrike">
+                          <a:latin typeface="Courier New"/>
+                        </a:rPr>
+                        <a:t>print (‘x is 5’)</a:t>
+                      </a:r>
+                      <a:endParaRPr b="0" lang="en-IE" sz="1800" spc="-1" strike="noStrike">
+                        <a:latin typeface="Courier New"/>
+                      </a:endParaRPr>
+                    </a:p>
+                    <a:p>
+                      <a:r>
+                        <a:rPr b="0" lang="en-IE" sz="1800" spc="-1" strike="noStrike">
+                          <a:latin typeface="Courier New"/>
+                        </a:rPr>
+                        <a:t>elif x == 6:</a:t>
+                      </a:r>
+                      <a:endParaRPr b="0" lang="en-IE" sz="1800" spc="-1" strike="noStrike">
+                        <a:latin typeface="Courier New"/>
+                      </a:endParaRPr>
+                    </a:p>
+                    <a:p>
+                      <a:r>
+                        <a:rPr b="0" lang="en-IE" sz="1800" spc="-1" strike="noStrike">
+                          <a:latin typeface="Courier New"/>
+                        </a:rPr>
+                        <a:t>   </a:t>
+                      </a:r>
+                      <a:r>
+                        <a:rPr b="0" lang="en-IE" sz="1800" spc="-1" strike="noStrike">
+                          <a:latin typeface="Courier New"/>
+                        </a:rPr>
+                        <a:t>Print (‘x is 6’) </a:t>
+                      </a:r>
+                      <a:endParaRPr b="0" lang="en-IE" sz="1800" spc="-1" strike="noStrike">
+                        <a:latin typeface="Courier New"/>
+                      </a:endParaRPr>
+                    </a:p>
+                    <a:p>
+                      <a:r>
+                        <a:rPr b="0" lang="en-IE" sz="1800" spc="-1" strike="noStrike">
+                          <a:latin typeface="Courier New"/>
+                        </a:rPr>
+                        <a:t>else:</a:t>
+                      </a:r>
+                      <a:endParaRPr b="0" lang="en-IE" sz="1800" spc="-1" strike="noStrike">
+                        <a:latin typeface="Courier New"/>
+                      </a:endParaRPr>
+                    </a:p>
+                    <a:p>
+                      <a:r>
+                        <a:rPr b="0" lang="en-IE" sz="1800" spc="-1" strike="noStrike">
+                          <a:latin typeface="Courier New"/>
+                        </a:rPr>
+                        <a:t>   </a:t>
+                      </a:r>
+                      <a:r>
+                        <a:rPr b="0" lang="en-IE" sz="1800" spc="-1" strike="noStrike">
+                          <a:latin typeface="Courier New"/>
+                        </a:rPr>
+                        <a:t>print (‘x is not 5 or 6’)</a:t>
+                      </a:r>
+                      <a:endParaRPr b="0" lang="en-IE" sz="1800" spc="-1" strike="noStrike">
+                        <a:latin typeface="Courier New"/>
+                      </a:endParaRPr>
+                    </a:p>
+                  </a:txBody>
+                  <a:tcPr marL="90000" marR="90000">
+                    <a:lnL w="720">
+                      <a:solidFill>
+                        <a:srgbClr val="ffffff"/>
+                      </a:solidFill>
+                    </a:lnL>
+                    <a:lnR w="720">
+                      <a:solidFill>
+                        <a:srgbClr val="ffffff"/>
+                      </a:solidFill>
+                    </a:lnR>
+                    <a:lnT w="720">
+                      <a:solidFill>
+                        <a:srgbClr val="ffffff"/>
+                      </a:solidFill>
+                    </a:lnT>
+                    <a:lnB w="720">
+                      <a:solidFill>
+                        <a:srgbClr val="ffffff"/>
+                      </a:solidFill>
+                    </a:lnB>
+                    <a:solidFill>
+                      <a:srgbClr val="b3b3b3"/>
+                    </a:solidFill>
+                  </a:tcPr>
+                </a:tc>
+              </a:tr>
+            </a:tbl>
+          </a:graphicData>
+        </a:graphic>
+      </p:graphicFrame>
+    </p:spTree>
+  </p:cSld>
+  <p:timing>
+    <p:tnLst>
+      <p:par>
+        <p:cTn id="65" dur="indefinite" restart="never" nodeType="tmRoot">
+          <p:childTnLst>
+            <p:seq>
+              <p:cTn id="66" dur="indefinite" nodeType="mainSeq"/>
+              <p:prevCondLst>
+                <p:cond delay="0" evt="onPrev">
+                  <p:tgtEl>
+                    <p:sldTgt/>
+                  </p:tgtEl>
+                </p:cond>
+              </p:prevCondLst>
+              <p:nextCondLst>
+                <p:cond delay="0" evt="onNext">
+                  <p:tgtEl>
+                    <p:sldTgt/>
+                  </p:tgtEl>
+                </p:cond>
+              </p:nextCondLst>
+            </p:seq>
+          </p:childTnLst>
+        </p:cTn>
+      </p:par>
+    </p:tnLst>
+  </p:timing>
+</p:sld>
+</file>
+
+<file path=ppt/slides/slide34.xml><?xml version="1.0" encoding="utf-8"?>
+<p:sld xmlns:a="http://schemas.openxmlformats.org/drawingml/2006/main" xmlns:p="http://schemas.openxmlformats.org/presentationml/2006/main" xmlns:r="http://schemas.openxmlformats.org/officeDocument/2006/relationships" xmlns:p14="http://schemas.microsoft.com/office/powerpoint/2010/main" xmlns:p15="http://schemas.microsoft.com/office/powerpoint/2012/main" xmlns:mc="http://schemas.openxmlformats.org/markup-compatibility/2006">
+  <p:cSld>
+    <p:spTree>
+      <p:nvGrpSpPr>
+        <p:cNvPr id="1" name=""/>
+        <p:cNvGrpSpPr/>
+        <p:nvPr/>
+      </p:nvGrpSpPr>
+      <p:grpSpPr>
+        <a:xfrm>
+          <a:off x="0" y="0"/>
+          <a:ext cx="0" cy="0"/>
+          <a:chOff x="0" y="0"/>
+          <a:chExt cx="0" cy="0"/>
+        </a:xfrm>
+      </p:grpSpPr>
+      <p:sp>
+        <p:nvSpPr>
+          <p:cNvPr id="168" name="TextShape 1"/>
+          <p:cNvSpPr txBox="1"/>
+          <p:nvPr/>
+        </p:nvSpPr>
+        <p:spPr>
+          <a:xfrm>
+            <a:off x="504000" y="301320"/>
+            <a:ext cx="9071640" cy="637560"/>
+          </a:xfrm>
+          <a:prstGeom prst="rect">
+            <a:avLst/>
+          </a:prstGeom>
+          <a:noFill/>
+          <a:ln>
+            <a:noFill/>
+          </a:ln>
+        </p:spPr>
+        <p:txBody>
+          <a:bodyPr lIns="0" rIns="0" tIns="0" bIns="0" anchor="ctr"/>
+          <a:p>
+            <a:pPr algn="ctr"/>
+            <a:r>
+              <a:rPr b="0" lang="en-IE" sz="4400" spc="-1" strike="noStrike">
+                <a:solidFill>
+                  <a:srgbClr val="ffffff"/>
+                </a:solidFill>
+                <a:latin typeface="Arial"/>
+              </a:rPr>
+              <a:t>Introduction to Python</a:t>
+            </a:r>
+            <a:endParaRPr b="0" lang="en-IE" sz="4400" spc="-1" strike="noStrike">
+              <a:solidFill>
+                <a:srgbClr val="ffffff"/>
+              </a:solidFill>
+              <a:latin typeface="Arial"/>
+            </a:endParaRPr>
+          </a:p>
+        </p:txBody>
+      </p:sp>
+      <p:sp>
+        <p:nvSpPr>
+          <p:cNvPr id="169" name="TextShape 2"/>
+          <p:cNvSpPr txBox="1"/>
+          <p:nvPr/>
+        </p:nvSpPr>
+        <p:spPr>
+          <a:xfrm>
+            <a:off x="504000" y="1769040"/>
+            <a:ext cx="9071640" cy="4384440"/>
+          </a:xfrm>
+          <a:prstGeom prst="rect">
+            <a:avLst/>
+          </a:prstGeom>
+          <a:noFill/>
+          <a:ln>
+            <a:noFill/>
+          </a:ln>
+        </p:spPr>
+        <p:txBody>
+          <a:bodyPr lIns="0" rIns="0" tIns="0" bIns="0"/>
+          <a:p>
+            <a:pPr marL="432000" indent="-324000">
+              <a:spcBef>
+                <a:spcPts val="1417"/>
+              </a:spcBef>
+              <a:buClr>
+                <a:srgbClr val="000000"/>
+              </a:buClr>
+              <a:buSzPct val="45000"/>
+              <a:buFont typeface="Wingdings" charset="2"/>
+              <a:buChar char=""/>
+            </a:pPr>
+            <a:r>
+              <a:rPr b="0" lang="en-IE" sz="3200" spc="-1" strike="noStrike">
+                <a:solidFill>
+                  <a:srgbClr val="0066cc"/>
+                </a:solidFill>
+                <a:latin typeface="Arial"/>
+              </a:rPr>
+              <a:t>Python allows us to iterate in our programs with two constructs, the </a:t>
+            </a:r>
+            <a:r>
+              <a:rPr b="0" i="1" lang="en-IE" sz="3200" spc="-1" strike="noStrike">
+                <a:solidFill>
+                  <a:srgbClr val="0066cc"/>
+                </a:solidFill>
+                <a:latin typeface="Arial"/>
+              </a:rPr>
+              <a:t>for</a:t>
+            </a:r>
+            <a:r>
+              <a:rPr b="0" lang="en-IE" sz="3200" spc="-1" strike="noStrike">
+                <a:solidFill>
+                  <a:srgbClr val="0066cc"/>
+                </a:solidFill>
+                <a:latin typeface="Arial"/>
+              </a:rPr>
+              <a:t> loop and the </a:t>
+            </a:r>
+            <a:r>
+              <a:rPr b="0" i="1" lang="en-IE" sz="3200" spc="-1" strike="noStrike">
+                <a:solidFill>
+                  <a:srgbClr val="0066cc"/>
+                </a:solidFill>
+                <a:latin typeface="Arial"/>
+              </a:rPr>
+              <a:t>while</a:t>
+            </a:r>
+            <a:r>
+              <a:rPr b="0" lang="en-IE" sz="3200" spc="-1" strike="noStrike">
+                <a:solidFill>
+                  <a:srgbClr val="0066cc"/>
+                </a:solidFill>
+                <a:latin typeface="Arial"/>
+              </a:rPr>
+              <a:t> loop. </a:t>
+            </a:r>
+            <a:endParaRPr b="0" lang="en-IE" sz="3200" spc="-1" strike="noStrike">
+              <a:solidFill>
+                <a:srgbClr val="0066cc"/>
+              </a:solidFill>
+              <a:latin typeface="Arial"/>
+            </a:endParaRPr>
+          </a:p>
+          <a:p>
+            <a:pPr marL="432000" indent="-324000">
+              <a:spcBef>
+                <a:spcPts val="1417"/>
+              </a:spcBef>
+              <a:buClr>
+                <a:srgbClr val="000000"/>
+              </a:buClr>
+              <a:buSzPct val="45000"/>
+              <a:buFont typeface="Wingdings" charset="2"/>
+              <a:buChar char=""/>
+            </a:pPr>
+            <a:endParaRPr b="0" lang="en-IE" sz="3200" spc="-1" strike="noStrike">
+              <a:solidFill>
+                <a:srgbClr val="0066cc"/>
+              </a:solidFill>
+              <a:latin typeface="Arial"/>
+            </a:endParaRPr>
+          </a:p>
+          <a:p>
+            <a:pPr marL="432000" indent="-324000">
+              <a:spcBef>
+                <a:spcPts val="1417"/>
+              </a:spcBef>
+              <a:buClr>
+                <a:srgbClr val="000000"/>
+              </a:buClr>
+              <a:buSzPct val="45000"/>
+              <a:buFont typeface="Wingdings" charset="2"/>
+              <a:buChar char=""/>
+            </a:pPr>
+            <a:endParaRPr b="0" lang="en-IE" sz="3200" spc="-1" strike="noStrike">
+              <a:solidFill>
+                <a:srgbClr val="0066cc"/>
+              </a:solidFill>
+              <a:latin typeface="Arial"/>
+            </a:endParaRPr>
+          </a:p>
+          <a:p>
+            <a:pPr marL="432000" indent="-324000">
+              <a:spcBef>
+                <a:spcPts val="1417"/>
+              </a:spcBef>
+              <a:buClr>
+                <a:srgbClr val="000000"/>
+              </a:buClr>
+              <a:buSzPct val="45000"/>
+              <a:buFont typeface="Wingdings" charset="2"/>
+              <a:buChar char=""/>
+            </a:pPr>
+            <a:r>
+              <a:rPr b="0" lang="en-IE" sz="3200" spc="-1" strike="noStrike">
+                <a:solidFill>
+                  <a:srgbClr val="0066cc"/>
+                </a:solidFill>
+                <a:latin typeface="Arial"/>
+              </a:rPr>
+              <a:t>Here we print out values from 1 to 4 (As with lists and slices, we subtract 1 from the last value.  We use the </a:t>
+            </a:r>
+            <a:r>
+              <a:rPr b="0" i="1" lang="en-IE" sz="3200" spc="-1" strike="noStrike">
+                <a:solidFill>
+                  <a:srgbClr val="0066cc"/>
+                </a:solidFill>
+                <a:latin typeface="Arial"/>
+              </a:rPr>
+              <a:t>range() </a:t>
+            </a:r>
+            <a:r>
+              <a:rPr b="0" lang="en-IE" sz="3200" spc="-1" strike="noStrike">
+                <a:solidFill>
+                  <a:srgbClr val="0066cc"/>
+                </a:solidFill>
+                <a:latin typeface="Arial"/>
+              </a:rPr>
+              <a:t>function to generate a list of numbers from 1 to 4. </a:t>
+            </a:r>
+            <a:endParaRPr b="0" lang="en-IE" sz="3200" spc="-1" strike="noStrike">
+              <a:solidFill>
+                <a:srgbClr val="0066cc"/>
+              </a:solidFill>
+              <a:latin typeface="Arial"/>
+            </a:endParaRPr>
+          </a:p>
+        </p:txBody>
+      </p:sp>
+      <p:graphicFrame>
+        <p:nvGraphicFramePr>
+          <p:cNvPr id="170" name="Table 3"/>
+          <p:cNvGraphicFramePr/>
+          <p:nvPr/>
+        </p:nvGraphicFramePr>
+        <p:xfrm>
+          <a:off x="723240" y="3040200"/>
+          <a:ext cx="5075280" cy="612000"/>
+        </p:xfrm>
+        <a:graphic>
+          <a:graphicData uri="http://schemas.openxmlformats.org/drawingml/2006/table">
+            <a:tbl>
+              <a:tblPr/>
+              <a:tblGrid>
+                <a:gridCol w="5075640"/>
+              </a:tblGrid>
+              <a:tr h="457560">
+                <a:tc>
+                  <a:txBody>
+                    <a:bodyPr lIns="90000" rIns="90000" tIns="46800" bIns="46800"/>
+                    <a:p>
+                      <a:r>
+                        <a:rPr b="0" lang="en-IE" sz="1800" spc="-1" strike="noStrike">
+                          <a:latin typeface="Courier New"/>
+                        </a:rPr>
+                        <a:t>For i in range(1,5):</a:t>
+                      </a:r>
+                      <a:endParaRPr b="0" lang="en-IE" sz="1800" spc="-1" strike="noStrike">
+                        <a:latin typeface="Courier New"/>
+                      </a:endParaRPr>
+                    </a:p>
+                    <a:p>
+                      <a:r>
+                        <a:rPr b="0" lang="en-IE" sz="1800" spc="-1" strike="noStrike">
+                          <a:latin typeface="Courier New"/>
+                        </a:rPr>
+                        <a:t>    </a:t>
+                      </a:r>
+                      <a:r>
+                        <a:rPr b="0" lang="en-IE" sz="1800" spc="-1" strike="noStrike">
+                          <a:latin typeface="Courier New"/>
+                        </a:rPr>
+                        <a:t>print (i)</a:t>
+                      </a:r>
+                      <a:endParaRPr b="0" lang="en-IE" sz="1800" spc="-1" strike="noStrike">
+                        <a:latin typeface="Courier New"/>
+                      </a:endParaRPr>
+                    </a:p>
+                  </a:txBody>
+                  <a:tcPr marL="90000" marR="90000">
+                    <a:lnL w="720">
+                      <a:solidFill>
+                        <a:srgbClr val="ffffff"/>
+                      </a:solidFill>
+                    </a:lnL>
+                    <a:lnR w="720">
+                      <a:solidFill>
+                        <a:srgbClr val="ffffff"/>
+                      </a:solidFill>
+                    </a:lnR>
+                    <a:lnT w="720">
+                      <a:solidFill>
+                        <a:srgbClr val="ffffff"/>
+                      </a:solidFill>
+                    </a:lnT>
+                    <a:lnB w="720">
+                      <a:solidFill>
+                        <a:srgbClr val="ffffff"/>
+                      </a:solidFill>
+                    </a:lnB>
+                    <a:solidFill>
+                      <a:srgbClr val="b3b3b3"/>
+                    </a:solidFill>
+                  </a:tcPr>
+                </a:tc>
+              </a:tr>
+            </a:tbl>
+          </a:graphicData>
+        </a:graphic>
+      </p:graphicFrame>
+    </p:spTree>
+  </p:cSld>
+  <p:timing>
+    <p:tnLst>
+      <p:par>
+        <p:cTn id="67" dur="indefinite" restart="never" nodeType="tmRoot">
+          <p:childTnLst>
+            <p:seq>
+              <p:cTn id="68" dur="indefinite" nodeType="mainSeq"/>
+              <p:prevCondLst>
+                <p:cond delay="0" evt="onPrev">
+                  <p:tgtEl>
+                    <p:sldTgt/>
+                  </p:tgtEl>
+                </p:cond>
+              </p:prevCondLst>
+              <p:nextCondLst>
+                <p:cond delay="0" evt="onNext">
+                  <p:tgtEl>
+                    <p:sldTgt/>
+                  </p:tgtEl>
+                </p:cond>
+              </p:nextCondLst>
+            </p:seq>
+          </p:childTnLst>
+        </p:cTn>
+      </p:par>
+    </p:tnLst>
+  </p:timing>
+</p:sld>
+</file>
+
+<file path=ppt/slides/slide35.xml><?xml version="1.0" encoding="utf-8"?>
+<p:sld xmlns:a="http://schemas.openxmlformats.org/drawingml/2006/main" xmlns:p="http://schemas.openxmlformats.org/presentationml/2006/main" xmlns:r="http://schemas.openxmlformats.org/officeDocument/2006/relationships" xmlns:p14="http://schemas.microsoft.com/office/powerpoint/2010/main" xmlns:p15="http://schemas.microsoft.com/office/powerpoint/2012/main" xmlns:mc="http://schemas.openxmlformats.org/markup-compatibility/2006">
+  <p:cSld>
+    <p:spTree>
+      <p:nvGrpSpPr>
+        <p:cNvPr id="1" name=""/>
+        <p:cNvGrpSpPr/>
+        <p:nvPr/>
+      </p:nvGrpSpPr>
+      <p:grpSpPr>
+        <a:xfrm>
+          <a:off x="0" y="0"/>
+          <a:ext cx="0" cy="0"/>
+          <a:chOff x="0" y="0"/>
+          <a:chExt cx="0" cy="0"/>
+        </a:xfrm>
+      </p:grpSpPr>
+      <p:sp>
+        <p:nvSpPr>
+          <p:cNvPr id="171" name="TextShape 1"/>
+          <p:cNvSpPr txBox="1"/>
+          <p:nvPr/>
+        </p:nvSpPr>
+        <p:spPr>
+          <a:xfrm>
+            <a:off x="504000" y="301320"/>
+            <a:ext cx="9071640" cy="637560"/>
+          </a:xfrm>
+          <a:prstGeom prst="rect">
+            <a:avLst/>
+          </a:prstGeom>
+          <a:noFill/>
+          <a:ln>
+            <a:noFill/>
+          </a:ln>
+        </p:spPr>
+        <p:txBody>
+          <a:bodyPr lIns="0" rIns="0" tIns="0" bIns="0" anchor="ctr"/>
+          <a:p>
+            <a:pPr algn="ctr"/>
+            <a:r>
+              <a:rPr b="0" lang="en-IE" sz="4400" spc="-1" strike="noStrike">
+                <a:solidFill>
+                  <a:srgbClr val="ffffff"/>
+                </a:solidFill>
+                <a:latin typeface="Arial"/>
+              </a:rPr>
+              <a:t>Introduction to Python</a:t>
+            </a:r>
+            <a:endParaRPr b="0" lang="en-IE" sz="4400" spc="-1" strike="noStrike">
+              <a:solidFill>
+                <a:srgbClr val="ffffff"/>
+              </a:solidFill>
+              <a:latin typeface="Arial"/>
+            </a:endParaRPr>
+          </a:p>
+        </p:txBody>
+      </p:sp>
+      <p:sp>
+        <p:nvSpPr>
+          <p:cNvPr id="172" name="TextShape 2"/>
+          <p:cNvSpPr txBox="1"/>
+          <p:nvPr/>
+        </p:nvSpPr>
+        <p:spPr>
+          <a:xfrm>
+            <a:off x="504000" y="1769040"/>
+            <a:ext cx="9071640" cy="4384440"/>
+          </a:xfrm>
+          <a:prstGeom prst="rect">
+            <a:avLst/>
+          </a:prstGeom>
+          <a:noFill/>
+          <a:ln>
+            <a:noFill/>
+          </a:ln>
+        </p:spPr>
+        <p:txBody>
+          <a:bodyPr lIns="0" rIns="0" tIns="0" bIns="0"/>
+          <a:p>
+            <a:pPr marL="432000" indent="-324000">
+              <a:spcBef>
+                <a:spcPts val="1417"/>
+              </a:spcBef>
+              <a:buClr>
+                <a:srgbClr val="000000"/>
+              </a:buClr>
+              <a:buSzPct val="45000"/>
+              <a:buFont typeface="Wingdings" charset="2"/>
+              <a:buChar char=""/>
+            </a:pPr>
+            <a:r>
+              <a:rPr b="0" lang="en-IE" sz="3200" spc="-1" strike="noStrike">
+                <a:solidFill>
+                  <a:srgbClr val="0066cc"/>
+                </a:solidFill>
+                <a:latin typeface="Arial"/>
+              </a:rPr>
+              <a:t>The while loop also allows iteration.  A while loop will continue to iterate as long as the condition specified is True.  </a:t>
+            </a:r>
+            <a:endParaRPr b="0" lang="en-IE" sz="3200" spc="-1" strike="noStrike">
+              <a:solidFill>
+                <a:srgbClr val="0066cc"/>
+              </a:solidFill>
+              <a:latin typeface="Arial"/>
+            </a:endParaRPr>
+          </a:p>
+          <a:p>
+            <a:pPr marL="432000" indent="-324000">
+              <a:spcBef>
+                <a:spcPts val="1417"/>
+              </a:spcBef>
+              <a:buClr>
+                <a:srgbClr val="000000"/>
+              </a:buClr>
+              <a:buSzPct val="45000"/>
+              <a:buFont typeface="Wingdings" charset="2"/>
+              <a:buChar char=""/>
+            </a:pPr>
+            <a:endParaRPr b="0" lang="en-IE" sz="3200" spc="-1" strike="noStrike">
+              <a:solidFill>
+                <a:srgbClr val="0066cc"/>
+              </a:solidFill>
+              <a:latin typeface="Arial"/>
+            </a:endParaRPr>
+          </a:p>
+          <a:p>
+            <a:pPr marL="432000" indent="-324000">
+              <a:spcBef>
+                <a:spcPts val="1417"/>
+              </a:spcBef>
+              <a:buClr>
+                <a:srgbClr val="000000"/>
+              </a:buClr>
+              <a:buSzPct val="45000"/>
+              <a:buFont typeface="Wingdings" charset="2"/>
+              <a:buChar char=""/>
+            </a:pPr>
+            <a:endParaRPr b="0" lang="en-IE" sz="3200" spc="-1" strike="noStrike">
+              <a:solidFill>
+                <a:srgbClr val="0066cc"/>
+              </a:solidFill>
+              <a:latin typeface="Arial"/>
+            </a:endParaRPr>
+          </a:p>
+          <a:p>
+            <a:pPr marL="432000" indent="-324000">
+              <a:spcBef>
+                <a:spcPts val="1417"/>
+              </a:spcBef>
+              <a:buClr>
+                <a:srgbClr val="000000"/>
+              </a:buClr>
+              <a:buSzPct val="45000"/>
+              <a:buFont typeface="Wingdings" charset="2"/>
+              <a:buChar char=""/>
+            </a:pPr>
+            <a:endParaRPr b="0" lang="en-IE" sz="3200" spc="-1" strike="noStrike">
+              <a:solidFill>
+                <a:srgbClr val="0066cc"/>
+              </a:solidFill>
+              <a:latin typeface="Arial"/>
+            </a:endParaRPr>
+          </a:p>
+          <a:p>
+            <a:pPr marL="432000" indent="-324000">
+              <a:spcBef>
+                <a:spcPts val="1417"/>
+              </a:spcBef>
+              <a:buClr>
+                <a:srgbClr val="000000"/>
+              </a:buClr>
+              <a:buSzPct val="45000"/>
+              <a:buFont typeface="Wingdings" charset="2"/>
+              <a:buChar char=""/>
+            </a:pPr>
+            <a:r>
+              <a:rPr b="0" lang="en-IE" sz="3200" spc="-1" strike="noStrike">
+                <a:solidFill>
+                  <a:srgbClr val="0066cc"/>
+                </a:solidFill>
+                <a:latin typeface="Arial"/>
+              </a:rPr>
+              <a:t>Here we print out values from 10 to 1 </a:t>
+            </a:r>
+            <a:endParaRPr b="0" lang="en-IE" sz="3200" spc="-1" strike="noStrike">
+              <a:solidFill>
+                <a:srgbClr val="0066cc"/>
+              </a:solidFill>
+              <a:latin typeface="Arial"/>
+            </a:endParaRPr>
+          </a:p>
+        </p:txBody>
+      </p:sp>
+      <p:graphicFrame>
+        <p:nvGraphicFramePr>
+          <p:cNvPr id="173" name="Table 3"/>
+          <p:cNvGraphicFramePr/>
+          <p:nvPr/>
+        </p:nvGraphicFramePr>
+        <p:xfrm>
+          <a:off x="723240" y="3040200"/>
+          <a:ext cx="5075280" cy="612000"/>
+        </p:xfrm>
+        <a:graphic>
+          <a:graphicData uri="http://schemas.openxmlformats.org/drawingml/2006/table">
+            <a:tbl>
+              <a:tblPr/>
+              <a:tblGrid>
+                <a:gridCol w="5075640"/>
+              </a:tblGrid>
+              <a:tr h="457560">
+                <a:tc>
+                  <a:txBody>
+                    <a:bodyPr lIns="90000" rIns="90000" tIns="46800" bIns="46800"/>
+                    <a:p>
+                      <a:r>
+                        <a:rPr b="0" lang="en-IE" sz="1800" spc="-1" strike="noStrike">
+                          <a:latin typeface="Courier New"/>
+                        </a:rPr>
+                        <a:t>x = 10</a:t>
+                      </a:r>
+                      <a:endParaRPr b="0" lang="en-IE" sz="1800" spc="-1" strike="noStrike">
+                        <a:latin typeface="Courier New"/>
+                      </a:endParaRPr>
+                    </a:p>
+                    <a:p>
+                      <a:r>
+                        <a:rPr b="0" lang="en-IE" sz="1800" spc="-1" strike="noStrike">
+                          <a:latin typeface="Courier New"/>
+                        </a:rPr>
+                        <a:t>while x &gt; 0:</a:t>
+                      </a:r>
+                      <a:endParaRPr b="0" lang="en-IE" sz="1800" spc="-1" strike="noStrike">
+                        <a:latin typeface="Courier New"/>
+                      </a:endParaRPr>
+                    </a:p>
+                    <a:p>
+                      <a:r>
+                        <a:rPr b="0" lang="en-IE" sz="1800" spc="-1" strike="noStrike">
+                          <a:latin typeface="Courier New"/>
+                        </a:rPr>
+                        <a:t>    </a:t>
+                      </a:r>
+                      <a:r>
+                        <a:rPr b="0" lang="en-IE" sz="1800" spc="-1" strike="noStrike">
+                          <a:latin typeface="Courier New"/>
+                        </a:rPr>
+                        <a:t>print (x)</a:t>
+                      </a:r>
+                      <a:endParaRPr b="0" lang="en-IE" sz="1800" spc="-1" strike="noStrike">
+                        <a:latin typeface="Courier New"/>
+                      </a:endParaRPr>
+                    </a:p>
+                    <a:p>
+                      <a:r>
+                        <a:rPr b="0" lang="en-IE" sz="1800" spc="-1" strike="noStrike">
+                          <a:latin typeface="Courier New"/>
+                        </a:rPr>
+                        <a:t>    </a:t>
+                      </a:r>
+                      <a:r>
+                        <a:rPr b="0" lang="en-IE" sz="1800" spc="-1" strike="noStrike">
+                          <a:latin typeface="Courier New"/>
+                        </a:rPr>
+                        <a:t>x -= 1</a:t>
+                      </a:r>
+                      <a:endParaRPr b="0" lang="en-IE" sz="1800" spc="-1" strike="noStrike">
+                        <a:latin typeface="Courier New"/>
+                      </a:endParaRPr>
+                    </a:p>
+                  </a:txBody>
+                  <a:tcPr marL="90000" marR="90000">
+                    <a:lnL w="720">
+                      <a:solidFill>
+                        <a:srgbClr val="ffffff"/>
+                      </a:solidFill>
+                    </a:lnL>
+                    <a:lnR w="720">
+                      <a:solidFill>
+                        <a:srgbClr val="ffffff"/>
+                      </a:solidFill>
+                    </a:lnR>
+                    <a:lnT w="720">
+                      <a:solidFill>
+                        <a:srgbClr val="ffffff"/>
+                      </a:solidFill>
+                    </a:lnT>
+                    <a:lnB w="720">
+                      <a:solidFill>
+                        <a:srgbClr val="ffffff"/>
+                      </a:solidFill>
+                    </a:lnB>
+                    <a:solidFill>
+                      <a:srgbClr val="b3b3b3"/>
+                    </a:solidFill>
+                  </a:tcPr>
+                </a:tc>
+              </a:tr>
+            </a:tbl>
+          </a:graphicData>
+        </a:graphic>
+      </p:graphicFrame>
+    </p:spTree>
+  </p:cSld>
+  <p:timing>
+    <p:tnLst>
+      <p:par>
+        <p:cTn id="69" dur="indefinite" restart="never" nodeType="tmRoot">
+          <p:childTnLst>
+            <p:seq>
+              <p:cTn id="70" dur="indefinite" nodeType="mainSeq"/>
+              <p:prevCondLst>
+                <p:cond delay="0" evt="onPrev">
+                  <p:tgtEl>
+                    <p:sldTgt/>
+                  </p:tgtEl>
+                </p:cond>
+              </p:prevCondLst>
+              <p:nextCondLst>
+                <p:cond delay="0" evt="onNext">
+                  <p:tgtEl>
+                    <p:sldTgt/>
+                  </p:tgtEl>
+                </p:cond>
+              </p:nextCondLst>
+            </p:seq>
+          </p:childTnLst>
+        </p:cTn>
+      </p:par>
+    </p:tnLst>
+  </p:timing>
+</p:sld>
+</file>
+
+<file path=ppt/slides/slide36.xml><?xml version="1.0" encoding="utf-8"?>
+<p:sld xmlns:a="http://schemas.openxmlformats.org/drawingml/2006/main" xmlns:p="http://schemas.openxmlformats.org/presentationml/2006/main" xmlns:r="http://schemas.openxmlformats.org/officeDocument/2006/relationships" xmlns:p14="http://schemas.microsoft.com/office/powerpoint/2010/main" xmlns:p15="http://schemas.microsoft.com/office/powerpoint/2012/main" xmlns:mc="http://schemas.openxmlformats.org/markup-compatibility/2006">
+  <p:cSld>
+    <p:spTree>
+      <p:nvGrpSpPr>
+        <p:cNvPr id="1" name=""/>
+        <p:cNvGrpSpPr/>
+        <p:nvPr/>
+      </p:nvGrpSpPr>
+      <p:grpSpPr>
+        <a:xfrm>
+          <a:off x="0" y="0"/>
+          <a:ext cx="0" cy="0"/>
+          <a:chOff x="0" y="0"/>
+          <a:chExt cx="0" cy="0"/>
+        </a:xfrm>
+      </p:grpSpPr>
+      <p:sp>
+        <p:nvSpPr>
+          <p:cNvPr id="174" name="TextShape 1"/>
+          <p:cNvSpPr txBox="1"/>
+          <p:nvPr/>
+        </p:nvSpPr>
+        <p:spPr>
+          <a:xfrm>
+            <a:off x="504000" y="301320"/>
+            <a:ext cx="9071640" cy="637560"/>
+          </a:xfrm>
+          <a:prstGeom prst="rect">
+            <a:avLst/>
+          </a:prstGeom>
+          <a:noFill/>
+          <a:ln>
+            <a:noFill/>
+          </a:ln>
+        </p:spPr>
+        <p:txBody>
+          <a:bodyPr lIns="0" rIns="0" tIns="0" bIns="0" anchor="ctr"/>
+          <a:p>
+            <a:pPr algn="ctr"/>
+            <a:r>
+              <a:rPr b="0" lang="en-IE" sz="4400" spc="-1" strike="noStrike">
+                <a:solidFill>
+                  <a:srgbClr val="ffffff"/>
+                </a:solidFill>
+                <a:latin typeface="Arial"/>
+              </a:rPr>
+              <a:t>Introduction to Python</a:t>
+            </a:r>
+            <a:endParaRPr b="0" lang="en-IE" sz="4400" spc="-1" strike="noStrike">
+              <a:solidFill>
+                <a:srgbClr val="ffffff"/>
+              </a:solidFill>
+              <a:latin typeface="Arial"/>
+            </a:endParaRPr>
+          </a:p>
+        </p:txBody>
+      </p:sp>
+      <p:sp>
+        <p:nvSpPr>
+          <p:cNvPr id="175" name="TextShape 2"/>
+          <p:cNvSpPr txBox="1"/>
+          <p:nvPr/>
+        </p:nvSpPr>
+        <p:spPr>
+          <a:xfrm>
+            <a:off x="504000" y="1769040"/>
+            <a:ext cx="9071640" cy="4384440"/>
+          </a:xfrm>
+          <a:prstGeom prst="rect">
+            <a:avLst/>
+          </a:prstGeom>
+          <a:noFill/>
+          <a:ln>
+            <a:noFill/>
+          </a:ln>
+        </p:spPr>
+        <p:txBody>
+          <a:bodyPr lIns="0" rIns="0" tIns="0" bIns="0"/>
+          <a:p>
+            <a:pPr marL="432000" indent="-324000">
+              <a:spcBef>
+                <a:spcPts val="1417"/>
+              </a:spcBef>
+              <a:buClr>
+                <a:srgbClr val="000000"/>
+              </a:buClr>
+              <a:buSzPct val="45000"/>
+              <a:buFont typeface="Wingdings" charset="2"/>
+              <a:buChar char=""/>
+            </a:pPr>
+            <a:r>
+              <a:rPr b="0" lang="en-IE" sz="3200" spc="-1" strike="noStrike">
+                <a:solidFill>
+                  <a:srgbClr val="0066cc"/>
+                </a:solidFill>
+                <a:latin typeface="Arial"/>
+              </a:rPr>
+              <a:t>Python also has the concept of functions.  </a:t>
+            </a:r>
+            <a:r>
+              <a:rPr b="0" lang="en-IE" sz="3200" spc="-1" strike="noStrike">
+                <a:solidFill>
+                  <a:srgbClr val="0066cc"/>
+                </a:solidFill>
+                <a:latin typeface="Arial"/>
+              </a:rPr>
+              <a:t>Functions are simply a block of code grouped </a:t>
+            </a:r>
+            <a:r>
+              <a:rPr b="0" lang="en-IE" sz="3200" spc="-1" strike="noStrike">
+                <a:solidFill>
+                  <a:srgbClr val="0066cc"/>
+                </a:solidFill>
+                <a:latin typeface="Arial"/>
+              </a:rPr>
+              <a:t>together. </a:t>
+            </a:r>
+            <a:endParaRPr b="0" lang="en-IE" sz="3200" spc="-1" strike="noStrike">
+              <a:solidFill>
+                <a:srgbClr val="0066cc"/>
+              </a:solidFill>
+              <a:latin typeface="Arial"/>
+            </a:endParaRPr>
+          </a:p>
+          <a:p>
+            <a:pPr marL="432000" indent="-324000">
+              <a:spcBef>
+                <a:spcPts val="1417"/>
+              </a:spcBef>
+              <a:buClr>
+                <a:srgbClr val="000000"/>
+              </a:buClr>
+              <a:buSzPct val="45000"/>
+              <a:buFont typeface="Wingdings" charset="2"/>
+              <a:buChar char=""/>
+            </a:pPr>
+            <a:r>
+              <a:rPr b="0" lang="en-IE" sz="3200" spc="-1" strike="noStrike">
+                <a:solidFill>
+                  <a:srgbClr val="0066cc"/>
+                </a:solidFill>
+                <a:latin typeface="Arial"/>
+              </a:rPr>
+              <a:t>Functions in Python can be pre-defined, such </a:t>
+            </a:r>
+            <a:r>
+              <a:rPr b="0" lang="en-IE" sz="3200" spc="-1" strike="noStrike">
+                <a:solidFill>
+                  <a:srgbClr val="0066cc"/>
+                </a:solidFill>
+                <a:latin typeface="Arial"/>
+              </a:rPr>
+              <a:t>as the print() or range() function, or can be </a:t>
+            </a:r>
+            <a:r>
+              <a:rPr b="0" lang="en-IE" sz="3200" spc="-1" strike="noStrike">
+                <a:solidFill>
+                  <a:srgbClr val="0066cc"/>
+                </a:solidFill>
+                <a:latin typeface="Arial"/>
+              </a:rPr>
+              <a:t>defined directly in our programs.</a:t>
+            </a:r>
+            <a:endParaRPr b="0" lang="en-IE" sz="3200" spc="-1" strike="noStrike">
+              <a:solidFill>
+                <a:srgbClr val="0066cc"/>
+              </a:solidFill>
+              <a:latin typeface="Arial"/>
+            </a:endParaRPr>
+          </a:p>
+          <a:p>
+            <a:pPr marL="432000" indent="-324000">
+              <a:spcBef>
+                <a:spcPts val="1417"/>
+              </a:spcBef>
+              <a:buClr>
+                <a:srgbClr val="000000"/>
+              </a:buClr>
+              <a:buSzPct val="45000"/>
+              <a:buFont typeface="Wingdings" charset="2"/>
+              <a:buChar char=""/>
+            </a:pPr>
+            <a:r>
+              <a:rPr b="0" lang="en-IE" sz="3200" spc="-1" strike="noStrike">
+                <a:solidFill>
+                  <a:srgbClr val="0066cc"/>
+                </a:solidFill>
+                <a:latin typeface="Arial"/>
+              </a:rPr>
+              <a:t> </a:t>
+            </a:r>
+            <a:r>
+              <a:rPr b="0" lang="en-IE" sz="3200" spc="-1" strike="noStrike">
+                <a:solidFill>
+                  <a:srgbClr val="0066cc"/>
+                </a:solidFill>
+                <a:latin typeface="Arial"/>
+              </a:rPr>
+              <a:t> </a:t>
+            </a:r>
+            <a:endParaRPr b="0" lang="en-IE" sz="3200" spc="-1" strike="noStrike">
+              <a:solidFill>
+                <a:srgbClr val="0066cc"/>
+              </a:solidFill>
+              <a:latin typeface="Arial"/>
+            </a:endParaRPr>
+          </a:p>
+        </p:txBody>
+      </p:sp>
+      <p:graphicFrame>
+        <p:nvGraphicFramePr>
+          <p:cNvPr id="176" name="Table 3"/>
+          <p:cNvGraphicFramePr/>
+          <p:nvPr/>
+        </p:nvGraphicFramePr>
+        <p:xfrm>
+          <a:off x="784080" y="4561200"/>
+          <a:ext cx="5075280" cy="719280"/>
+        </p:xfrm>
+        <a:graphic>
+          <a:graphicData uri="http://schemas.openxmlformats.org/drawingml/2006/table">
+            <a:tbl>
+              <a:tblPr/>
+              <a:tblGrid>
+                <a:gridCol w="5075640"/>
+              </a:tblGrid>
+              <a:tr h="719640">
+                <a:tc>
+                  <a:txBody>
+                    <a:bodyPr lIns="90000" rIns="90000" tIns="46800" bIns="46800"/>
+                    <a:p>
+                      <a:r>
+                        <a:rPr b="0" lang="en-IE" sz="1800" spc="-1" strike="noStrike">
+                          <a:latin typeface="Courier New"/>
+                        </a:rPr>
+                        <a:t>def myfunc():</a:t>
+                      </a:r>
+                      <a:endParaRPr b="0" lang="en-IE" sz="1800" spc="-1" strike="noStrike">
+                        <a:latin typeface="Arial"/>
+                      </a:endParaRPr>
+                    </a:p>
+                    <a:p>
+                      <a:r>
+                        <a:rPr b="0" lang="en-IE" sz="1800" spc="-1" strike="noStrike">
+                          <a:latin typeface="Courier New"/>
+                        </a:rPr>
+                        <a:t>    </a:t>
+                      </a:r>
+                      <a:r>
+                        <a:rPr b="0" lang="en-IE" sz="1800" spc="-1" strike="noStrike">
+                          <a:latin typeface="Courier New"/>
+                        </a:rPr>
+                        <a:t>print (‘Hi from myfunc!’)</a:t>
+                      </a:r>
+                      <a:endParaRPr b="0" lang="en-IE" sz="1800" spc="-1" strike="noStrike">
+                        <a:latin typeface="Arial"/>
+                      </a:endParaRPr>
+                    </a:p>
+                    <a:p>
+                      <a:r>
+                        <a:rPr b="0" lang="en-IE" sz="1800" spc="-1" strike="noStrike">
+                          <a:latin typeface="Courier New"/>
+                        </a:rPr>
+                        <a:t>myfunc() </a:t>
+                      </a:r>
+                      <a:endParaRPr b="0" lang="en-IE" sz="1800" spc="-1" strike="noStrike">
+                        <a:latin typeface="Arial"/>
+                      </a:endParaRPr>
+                    </a:p>
+                  </a:txBody>
+                  <a:tcPr marL="90000" marR="90000">
+                    <a:lnL w="720">
+                      <a:solidFill>
+                        <a:srgbClr val="ffffff"/>
+                      </a:solidFill>
+                    </a:lnL>
+                    <a:lnR w="720">
+                      <a:solidFill>
+                        <a:srgbClr val="ffffff"/>
+                      </a:solidFill>
+                    </a:lnR>
+                    <a:lnT w="720">
+                      <a:solidFill>
+                        <a:srgbClr val="ffffff"/>
+                      </a:solidFill>
+                    </a:lnT>
+                    <a:lnB w="720">
+                      <a:solidFill>
+                        <a:srgbClr val="ffffff"/>
+                      </a:solidFill>
+                    </a:lnB>
+                    <a:solidFill>
+                      <a:srgbClr val="b3b3b3"/>
+                    </a:solidFill>
+                  </a:tcPr>
+                </a:tc>
+              </a:tr>
+            </a:tbl>
+          </a:graphicData>
+        </a:graphic>
+      </p:graphicFrame>
+    </p:spTree>
+  </p:cSld>
+  <p:timing>
+    <p:tnLst>
+      <p:par>
+        <p:cTn id="71" dur="indefinite" restart="never" nodeType="tmRoot">
+          <p:childTnLst>
+            <p:seq>
+              <p:cTn id="72" dur="indefinite" nodeType="mainSeq"/>
+              <p:prevCondLst>
+                <p:cond delay="0" evt="onPrev">
+                  <p:tgtEl>
+                    <p:sldTgt/>
+                  </p:tgtEl>
+                </p:cond>
+              </p:prevCondLst>
+              <p:nextCondLst>
+                <p:cond delay="0" evt="onNext">
+                  <p:tgtEl>
+                    <p:sldTgt/>
+                  </p:tgtEl>
+                </p:cond>
+              </p:nextCondLst>
+            </p:seq>
+          </p:childTnLst>
+        </p:cTn>
+      </p:par>
+    </p:tnLst>
+  </p:timing>
+</p:sld>
+</file>
+
+<file path=ppt/slides/slide37.xml><?xml version="1.0" encoding="utf-8"?>
+<p:sld xmlns:a="http://schemas.openxmlformats.org/drawingml/2006/main" xmlns:p="http://schemas.openxmlformats.org/presentationml/2006/main" xmlns:r="http://schemas.openxmlformats.org/officeDocument/2006/relationships" xmlns:p14="http://schemas.microsoft.com/office/powerpoint/2010/main" xmlns:p15="http://schemas.microsoft.com/office/powerpoint/2012/main" xmlns:mc="http://schemas.openxmlformats.org/markup-compatibility/2006">
+  <p:cSld>
+    <p:spTree>
+      <p:nvGrpSpPr>
+        <p:cNvPr id="1" name=""/>
+        <p:cNvGrpSpPr/>
+        <p:nvPr/>
+      </p:nvGrpSpPr>
+      <p:grpSpPr>
+        <a:xfrm>
+          <a:off x="0" y="0"/>
+          <a:ext cx="0" cy="0"/>
+          <a:chOff x="0" y="0"/>
+          <a:chExt cx="0" cy="0"/>
+        </a:xfrm>
+      </p:grpSpPr>
+      <p:sp>
+        <p:nvSpPr>
+          <p:cNvPr id="177" name="TextShape 1"/>
+          <p:cNvSpPr txBox="1"/>
+          <p:nvPr/>
+        </p:nvSpPr>
+        <p:spPr>
+          <a:xfrm>
+            <a:off x="504000" y="301320"/>
+            <a:ext cx="9071640" cy="637560"/>
+          </a:xfrm>
+          <a:prstGeom prst="rect">
+            <a:avLst/>
+          </a:prstGeom>
+          <a:noFill/>
+          <a:ln>
+            <a:noFill/>
+          </a:ln>
+        </p:spPr>
+        <p:txBody>
+          <a:bodyPr lIns="0" rIns="0" tIns="0" bIns="0" anchor="ctr"/>
+          <a:p>
+            <a:pPr algn="ctr"/>
+            <a:r>
+              <a:rPr b="0" lang="en-IE" sz="4400" spc="-1" strike="noStrike">
+                <a:solidFill>
+                  <a:srgbClr val="ffffff"/>
+                </a:solidFill>
+                <a:latin typeface="Arial"/>
+              </a:rPr>
+              <a:t>Introduction to Python</a:t>
+            </a:r>
+            <a:endParaRPr b="0" lang="en-IE" sz="4400" spc="-1" strike="noStrike">
+              <a:solidFill>
+                <a:srgbClr val="ffffff"/>
+              </a:solidFill>
+              <a:latin typeface="Arial"/>
+            </a:endParaRPr>
+          </a:p>
+        </p:txBody>
+      </p:sp>
+      <p:sp>
+        <p:nvSpPr>
+          <p:cNvPr id="178" name="TextShape 2"/>
+          <p:cNvSpPr txBox="1"/>
+          <p:nvPr/>
+        </p:nvSpPr>
+        <p:spPr>
+          <a:xfrm>
+            <a:off x="504000" y="1769040"/>
+            <a:ext cx="9071640" cy="4384440"/>
+          </a:xfrm>
+          <a:prstGeom prst="rect">
+            <a:avLst/>
+          </a:prstGeom>
+          <a:noFill/>
+          <a:ln>
+            <a:noFill/>
+          </a:ln>
+        </p:spPr>
+        <p:txBody>
+          <a:bodyPr lIns="0" rIns="0" tIns="0" bIns="0"/>
+          <a:p>
+            <a:pPr marL="432000" indent="-324000">
+              <a:spcBef>
+                <a:spcPts val="1417"/>
+              </a:spcBef>
+              <a:buClr>
+                <a:srgbClr val="000000"/>
+              </a:buClr>
+              <a:buSzPct val="45000"/>
+              <a:buFont typeface="Wingdings" charset="2"/>
+              <a:buChar char=""/>
+            </a:pPr>
+            <a:r>
+              <a:rPr b="0" lang="en-IE" sz="3200" spc="-1" strike="noStrike">
+                <a:solidFill>
+                  <a:srgbClr val="0066cc"/>
+                </a:solidFill>
+                <a:latin typeface="Arial"/>
+              </a:rPr>
+              <a:t>Python provides the </a:t>
+            </a:r>
+            <a:r>
+              <a:rPr b="0" i="1" lang="en-IE" sz="3200" spc="-1" strike="noStrike">
+                <a:solidFill>
+                  <a:srgbClr val="0066cc"/>
+                </a:solidFill>
+                <a:latin typeface="Arial"/>
+              </a:rPr>
+              <a:t>def</a:t>
+            </a:r>
+            <a:r>
+              <a:rPr b="0" lang="en-IE" sz="3200" spc="-1" strike="noStrike">
+                <a:solidFill>
+                  <a:srgbClr val="0066cc"/>
+                </a:solidFill>
+                <a:latin typeface="Arial"/>
+              </a:rPr>
+              <a:t> keyword to allow us to </a:t>
+            </a:r>
+            <a:r>
+              <a:rPr b="0" lang="en-IE" sz="3200" spc="-1" strike="noStrike">
+                <a:solidFill>
+                  <a:srgbClr val="0066cc"/>
+                </a:solidFill>
+                <a:latin typeface="Arial"/>
+              </a:rPr>
+              <a:t>define functions.  Note that as with if/else and </a:t>
+            </a:r>
+            <a:r>
+              <a:rPr b="0" lang="en-IE" sz="3200" spc="-1" strike="noStrike">
+                <a:solidFill>
+                  <a:srgbClr val="0066cc"/>
+                </a:solidFill>
+                <a:latin typeface="Arial"/>
+              </a:rPr>
+              <a:t>for/while blocks, functions are defined with </a:t>
+            </a:r>
+            <a:r>
+              <a:rPr b="0" lang="en-IE" sz="3200" spc="-1" strike="noStrike">
+                <a:solidFill>
+                  <a:srgbClr val="0066cc"/>
+                </a:solidFill>
+                <a:latin typeface="Arial"/>
+              </a:rPr>
+              <a:t>indentation. </a:t>
+            </a:r>
+            <a:endParaRPr b="0" lang="en-IE" sz="3200" spc="-1" strike="noStrike">
+              <a:solidFill>
+                <a:srgbClr val="0066cc"/>
+              </a:solidFill>
+              <a:latin typeface="Arial"/>
+            </a:endParaRPr>
+          </a:p>
+          <a:p>
+            <a:pPr marL="432000" indent="-324000">
+              <a:spcBef>
+                <a:spcPts val="1417"/>
+              </a:spcBef>
+              <a:buClr>
+                <a:srgbClr val="000000"/>
+              </a:buClr>
+              <a:buSzPct val="45000"/>
+              <a:buFont typeface="Wingdings" charset="2"/>
+              <a:buChar char=""/>
+            </a:pPr>
+            <a:r>
+              <a:rPr b="0" lang="en-IE" sz="3200" spc="-1" strike="noStrike">
+                <a:solidFill>
+                  <a:srgbClr val="0066cc"/>
+                </a:solidFill>
+                <a:latin typeface="Arial"/>
+              </a:rPr>
+              <a:t>We can also pass data into a function by </a:t>
+            </a:r>
+            <a:r>
+              <a:rPr b="0" lang="en-IE" sz="3200" spc="-1" strike="noStrike">
+                <a:solidFill>
+                  <a:srgbClr val="0066cc"/>
+                </a:solidFill>
+                <a:latin typeface="Arial"/>
+              </a:rPr>
+              <a:t>means of </a:t>
+            </a:r>
+            <a:r>
+              <a:rPr b="0" i="1" lang="en-IE" sz="3200" spc="-1" strike="noStrike">
+                <a:solidFill>
+                  <a:srgbClr val="0066cc"/>
+                </a:solidFill>
+                <a:latin typeface="Arial"/>
+              </a:rPr>
+              <a:t>parameters. </a:t>
+            </a:r>
+            <a:endParaRPr b="0" lang="en-IE" sz="3200" spc="-1" strike="noStrike">
+              <a:solidFill>
+                <a:srgbClr val="0066cc"/>
+              </a:solidFill>
+              <a:latin typeface="Arial"/>
+            </a:endParaRPr>
+          </a:p>
+          <a:p>
+            <a:pPr marL="432000" indent="-324000">
+              <a:spcBef>
+                <a:spcPts val="1417"/>
+              </a:spcBef>
+              <a:buClr>
+                <a:srgbClr val="000000"/>
+              </a:buClr>
+              <a:buSzPct val="45000"/>
+              <a:buFont typeface="Wingdings" charset="2"/>
+              <a:buChar char=""/>
+            </a:pPr>
+            <a:endParaRPr b="0" lang="en-IE" sz="3200" spc="-1" strike="noStrike">
+              <a:solidFill>
+                <a:srgbClr val="0066cc"/>
+              </a:solidFill>
+              <a:latin typeface="Arial"/>
+            </a:endParaRPr>
+          </a:p>
+          <a:p>
+            <a:pPr marL="432000" indent="-324000">
+              <a:spcBef>
+                <a:spcPts val="1417"/>
+              </a:spcBef>
+              <a:buClr>
+                <a:srgbClr val="000000"/>
+              </a:buClr>
+              <a:buSzPct val="45000"/>
+              <a:buFont typeface="Wingdings" charset="2"/>
+              <a:buChar char=""/>
+            </a:pPr>
+            <a:r>
+              <a:rPr b="0" lang="en-IE" sz="3200" spc="-1" strike="noStrike">
+                <a:solidFill>
+                  <a:srgbClr val="0066cc"/>
+                </a:solidFill>
+                <a:latin typeface="Arial"/>
+              </a:rPr>
+              <a:t> </a:t>
+            </a:r>
+            <a:r>
+              <a:rPr b="0" lang="en-IE" sz="3200" spc="-1" strike="noStrike">
+                <a:solidFill>
+                  <a:srgbClr val="0066cc"/>
+                </a:solidFill>
+                <a:latin typeface="Arial"/>
+              </a:rPr>
+              <a:t> </a:t>
+            </a:r>
+            <a:endParaRPr b="0" lang="en-IE" sz="3200" spc="-1" strike="noStrike">
+              <a:solidFill>
+                <a:srgbClr val="0066cc"/>
+              </a:solidFill>
+              <a:latin typeface="Arial"/>
+            </a:endParaRPr>
+          </a:p>
+          <a:p>
+            <a:pPr marL="432000" indent="-324000">
+              <a:spcBef>
+                <a:spcPts val="1417"/>
+              </a:spcBef>
+              <a:buClr>
+                <a:srgbClr val="000000"/>
+              </a:buClr>
+              <a:buSzPct val="45000"/>
+              <a:buFont typeface="Wingdings" charset="2"/>
+              <a:buChar char=""/>
+            </a:pPr>
+            <a:r>
+              <a:rPr b="0" lang="en-IE" sz="3200" spc="-1" strike="noStrike">
+                <a:solidFill>
+                  <a:srgbClr val="0066cc"/>
+                </a:solidFill>
+                <a:latin typeface="Arial"/>
+              </a:rPr>
+              <a:t>The output of this program is 5.</a:t>
+            </a:r>
+            <a:endParaRPr b="0" lang="en-IE" sz="3200" spc="-1" strike="noStrike">
+              <a:solidFill>
+                <a:srgbClr val="0066cc"/>
+              </a:solidFill>
+              <a:latin typeface="Arial"/>
+            </a:endParaRPr>
+          </a:p>
+        </p:txBody>
+      </p:sp>
+      <p:graphicFrame>
+        <p:nvGraphicFramePr>
+          <p:cNvPr id="179" name="Table 3"/>
+          <p:cNvGraphicFramePr/>
+          <p:nvPr/>
+        </p:nvGraphicFramePr>
+        <p:xfrm>
+          <a:off x="784080" y="4561200"/>
+          <a:ext cx="5075280" cy="719280"/>
+        </p:xfrm>
+        <a:graphic>
+          <a:graphicData uri="http://schemas.openxmlformats.org/drawingml/2006/table">
+            <a:tbl>
+              <a:tblPr/>
+              <a:tblGrid>
+                <a:gridCol w="5075640"/>
+              </a:tblGrid>
+              <a:tr h="719640">
+                <a:tc>
+                  <a:txBody>
+                    <a:bodyPr lIns="90000" rIns="90000" tIns="46800" bIns="46800"/>
+                    <a:p>
+                      <a:r>
+                        <a:rPr b="0" lang="en-IE" sz="1800" spc="-1" strike="noStrike">
+                          <a:latin typeface="Courier New"/>
+                        </a:rPr>
+                        <a:t>def myfunc(x):</a:t>
+                      </a:r>
+                      <a:endParaRPr b="0" lang="en-IE" sz="1800" spc="-1" strike="noStrike">
+                        <a:latin typeface="Courier New"/>
+                      </a:endParaRPr>
+                    </a:p>
+                    <a:p>
+                      <a:r>
+                        <a:rPr b="0" lang="en-IE" sz="1800" spc="-1" strike="noStrike">
+                          <a:latin typeface="Courier New"/>
+                        </a:rPr>
+                        <a:t>    </a:t>
+                      </a:r>
+                      <a:r>
+                        <a:rPr b="0" lang="en-IE" sz="1800" spc="-1" strike="noStrike">
+                          <a:latin typeface="Courier New"/>
+                        </a:rPr>
+                        <a:t>print (x)</a:t>
+                      </a:r>
+                      <a:endParaRPr b="0" lang="en-IE" sz="1800" spc="-1" strike="noStrike">
+                        <a:latin typeface="Courier New"/>
+                      </a:endParaRPr>
+                    </a:p>
+                    <a:p>
+                      <a:r>
+                        <a:rPr b="0" lang="en-IE" sz="1800" spc="-1" strike="noStrike">
+                          <a:latin typeface="Courier New"/>
+                        </a:rPr>
+                        <a:t>myfunc(5)</a:t>
+                      </a:r>
+                      <a:endParaRPr b="0" lang="en-IE" sz="1800" spc="-1" strike="noStrike">
+                        <a:latin typeface="Courier New"/>
+                      </a:endParaRPr>
+                    </a:p>
+                  </a:txBody>
+                  <a:tcPr marL="90000" marR="90000">
+                    <a:lnL w="720">
+                      <a:solidFill>
+                        <a:srgbClr val="ffffff"/>
+                      </a:solidFill>
+                    </a:lnL>
+                    <a:lnR w="720">
+                      <a:solidFill>
+                        <a:srgbClr val="ffffff"/>
+                      </a:solidFill>
+                    </a:lnR>
+                    <a:lnT w="720">
+                      <a:solidFill>
+                        <a:srgbClr val="ffffff"/>
+                      </a:solidFill>
+                    </a:lnT>
+                    <a:lnB w="720">
+                      <a:solidFill>
+                        <a:srgbClr val="ffffff"/>
+                      </a:solidFill>
+                    </a:lnB>
+                    <a:solidFill>
+                      <a:srgbClr val="b3b3b3"/>
+                    </a:solidFill>
+                  </a:tcPr>
+                </a:tc>
+              </a:tr>
+            </a:tbl>
+          </a:graphicData>
+        </a:graphic>
+      </p:graphicFrame>
+    </p:spTree>
+  </p:cSld>
+  <p:timing>
+    <p:tnLst>
+      <p:par>
+        <p:cTn id="73" dur="indefinite" restart="never" nodeType="tmRoot">
+          <p:childTnLst>
+            <p:seq>
+              <p:cTn id="74" dur="indefinite" nodeType="mainSeq"/>
+              <p:prevCondLst>
+                <p:cond delay="0" evt="onPrev">
+                  <p:tgtEl>
+                    <p:sldTgt/>
+                  </p:tgtEl>
+                </p:cond>
+              </p:prevCondLst>
+              <p:nextCondLst>
+                <p:cond delay="0" evt="onNext">
+                  <p:tgtEl>
+                    <p:sldTgt/>
+                  </p:tgtEl>
+                </p:cond>
+              </p:nextCondLst>
+            </p:seq>
+          </p:childTnLst>
+        </p:cTn>
+      </p:par>
+    </p:tnLst>
+  </p:timing>
+</p:sld>
+</file>
+
+<file path=ppt/slides/slide38.xml><?xml version="1.0" encoding="utf-8"?>
+<p:sld xmlns:a="http://schemas.openxmlformats.org/drawingml/2006/main" xmlns:p="http://schemas.openxmlformats.org/presentationml/2006/main" xmlns:r="http://schemas.openxmlformats.org/officeDocument/2006/relationships" xmlns:p14="http://schemas.microsoft.com/office/powerpoint/2010/main" xmlns:p15="http://schemas.microsoft.com/office/powerpoint/2012/main" xmlns:mc="http://schemas.openxmlformats.org/markup-compatibility/2006">
+  <p:cSld>
+    <p:spTree>
+      <p:nvGrpSpPr>
+        <p:cNvPr id="1" name=""/>
+        <p:cNvGrpSpPr/>
+        <p:nvPr/>
+      </p:nvGrpSpPr>
+      <p:grpSpPr>
+        <a:xfrm>
+          <a:off x="0" y="0"/>
+          <a:ext cx="0" cy="0"/>
+          <a:chOff x="0" y="0"/>
+          <a:chExt cx="0" cy="0"/>
+        </a:xfrm>
+      </p:grpSpPr>
+      <p:sp>
+        <p:nvSpPr>
+          <p:cNvPr id="180" name="TextShape 1"/>
+          <p:cNvSpPr txBox="1"/>
+          <p:nvPr/>
+        </p:nvSpPr>
+        <p:spPr>
+          <a:xfrm>
+            <a:off x="504000" y="301320"/>
+            <a:ext cx="9071640" cy="637560"/>
+          </a:xfrm>
+          <a:prstGeom prst="rect">
+            <a:avLst/>
+          </a:prstGeom>
+          <a:noFill/>
+          <a:ln>
+            <a:noFill/>
+          </a:ln>
+        </p:spPr>
+        <p:txBody>
+          <a:bodyPr lIns="0" rIns="0" tIns="0" bIns="0" anchor="ctr"/>
+          <a:p>
+            <a:pPr algn="ctr"/>
+            <a:r>
+              <a:rPr b="0" lang="en-IE" sz="4400" spc="-1" strike="noStrike">
+                <a:solidFill>
+                  <a:srgbClr val="ffffff"/>
+                </a:solidFill>
+                <a:latin typeface="Arial"/>
+              </a:rPr>
+              <a:t>Introduction to Python</a:t>
+            </a:r>
+            <a:endParaRPr b="0" lang="en-IE" sz="4400" spc="-1" strike="noStrike">
+              <a:solidFill>
+                <a:srgbClr val="ffffff"/>
+              </a:solidFill>
+              <a:latin typeface="Arial"/>
+            </a:endParaRPr>
+          </a:p>
+        </p:txBody>
+      </p:sp>
+      <p:sp>
+        <p:nvSpPr>
+          <p:cNvPr id="181" name="TextShape 2"/>
+          <p:cNvSpPr txBox="1"/>
+          <p:nvPr/>
+        </p:nvSpPr>
+        <p:spPr>
+          <a:xfrm>
+            <a:off x="504000" y="1769040"/>
+            <a:ext cx="9071640" cy="4384440"/>
+          </a:xfrm>
+          <a:prstGeom prst="rect">
+            <a:avLst/>
+          </a:prstGeom>
+          <a:noFill/>
+          <a:ln>
+            <a:noFill/>
+          </a:ln>
+        </p:spPr>
+        <p:txBody>
+          <a:bodyPr lIns="0" rIns="0" tIns="0" bIns="0"/>
+          <a:p>
+            <a:pPr marL="432000" indent="-324000">
+              <a:spcBef>
+                <a:spcPts val="1417"/>
+              </a:spcBef>
+              <a:buClr>
+                <a:srgbClr val="000000"/>
+              </a:buClr>
+              <a:buSzPct val="45000"/>
+              <a:buFont typeface="Wingdings" charset="2"/>
+              <a:buChar char=""/>
+            </a:pPr>
+            <a:r>
+              <a:rPr b="0" lang="en-IE" sz="3200" spc="-1" strike="noStrike">
+                <a:solidFill>
+                  <a:srgbClr val="0066cc"/>
+                </a:solidFill>
+                <a:latin typeface="Arial"/>
+              </a:rPr>
+              <a:t>Python also allows us to pass data back from a function by using the </a:t>
+            </a:r>
+            <a:r>
+              <a:rPr b="0" i="1" lang="en-IE" sz="3200" spc="-1" strike="noStrike">
+                <a:solidFill>
+                  <a:srgbClr val="0066cc"/>
+                </a:solidFill>
+                <a:latin typeface="Arial"/>
+              </a:rPr>
+              <a:t>return</a:t>
+            </a:r>
+            <a:r>
+              <a:rPr b="0" lang="en-IE" sz="3200" spc="-1" strike="noStrike">
+                <a:solidFill>
+                  <a:srgbClr val="0066cc"/>
+                </a:solidFill>
+                <a:latin typeface="Arial"/>
+              </a:rPr>
+              <a:t> statement.</a:t>
+            </a:r>
+            <a:endParaRPr b="0" lang="en-IE" sz="3200" spc="-1" strike="noStrike">
+              <a:solidFill>
+                <a:srgbClr val="0066cc"/>
+              </a:solidFill>
+              <a:latin typeface="Arial"/>
+            </a:endParaRPr>
+          </a:p>
+          <a:p>
+            <a:pPr marL="432000" indent="-324000">
+              <a:spcBef>
+                <a:spcPts val="1417"/>
+              </a:spcBef>
+              <a:buClr>
+                <a:srgbClr val="000000"/>
+              </a:buClr>
+              <a:buSzPct val="45000"/>
+              <a:buFont typeface="Wingdings" charset="2"/>
+              <a:buChar char=""/>
+            </a:pPr>
+            <a:endParaRPr b="0" lang="en-IE" sz="3200" spc="-1" strike="noStrike">
+              <a:solidFill>
+                <a:srgbClr val="0066cc"/>
+              </a:solidFill>
+              <a:latin typeface="Arial"/>
+            </a:endParaRPr>
+          </a:p>
+          <a:p>
+            <a:pPr marL="432000" indent="-324000">
+              <a:spcBef>
+                <a:spcPts val="1417"/>
+              </a:spcBef>
+              <a:buClr>
+                <a:srgbClr val="000000"/>
+              </a:buClr>
+              <a:buSzPct val="45000"/>
+              <a:buFont typeface="Wingdings" charset="2"/>
+              <a:buChar char=""/>
+            </a:pPr>
+            <a:endParaRPr b="0" lang="en-IE" sz="3200" spc="-1" strike="noStrike">
+              <a:solidFill>
+                <a:srgbClr val="0066cc"/>
+              </a:solidFill>
+              <a:latin typeface="Arial"/>
+            </a:endParaRPr>
+          </a:p>
+          <a:p>
+            <a:pPr marL="432000" indent="-324000">
+              <a:spcBef>
+                <a:spcPts val="1417"/>
+              </a:spcBef>
+              <a:buClr>
+                <a:srgbClr val="000000"/>
+              </a:buClr>
+              <a:buSzPct val="45000"/>
+              <a:buFont typeface="Wingdings" charset="2"/>
+              <a:buChar char=""/>
+            </a:pPr>
+            <a:endParaRPr b="0" lang="en-IE" sz="3200" spc="-1" strike="noStrike">
+              <a:solidFill>
+                <a:srgbClr val="0066cc"/>
+              </a:solidFill>
+              <a:latin typeface="Arial"/>
+            </a:endParaRPr>
+          </a:p>
+          <a:p>
+            <a:pPr marL="432000" indent="-324000">
+              <a:spcBef>
+                <a:spcPts val="1417"/>
+              </a:spcBef>
+              <a:buClr>
+                <a:srgbClr val="000000"/>
+              </a:buClr>
+              <a:buSzPct val="45000"/>
+              <a:buFont typeface="Wingdings" charset="2"/>
+              <a:buChar char=""/>
+            </a:pPr>
+            <a:r>
+              <a:rPr b="0" lang="en-IE" sz="3200" spc="-1" strike="noStrike">
+                <a:solidFill>
+                  <a:srgbClr val="0066cc"/>
+                </a:solidFill>
+                <a:latin typeface="Arial"/>
+              </a:rPr>
+              <a:t>The output of this program is 10. </a:t>
+            </a:r>
+            <a:endParaRPr b="0" lang="en-IE" sz="3200" spc="-1" strike="noStrike">
+              <a:solidFill>
+                <a:srgbClr val="0066cc"/>
+              </a:solidFill>
+              <a:latin typeface="Arial"/>
+            </a:endParaRPr>
+          </a:p>
+        </p:txBody>
+      </p:sp>
+      <p:graphicFrame>
+        <p:nvGraphicFramePr>
+          <p:cNvPr id="182" name="Table 3"/>
+          <p:cNvGraphicFramePr/>
+          <p:nvPr/>
+        </p:nvGraphicFramePr>
+        <p:xfrm>
+          <a:off x="780480" y="2865600"/>
+          <a:ext cx="5075280" cy="871200"/>
+        </p:xfrm>
+        <a:graphic>
+          <a:graphicData uri="http://schemas.openxmlformats.org/drawingml/2006/table">
+            <a:tbl>
+              <a:tblPr/>
+              <a:tblGrid>
+                <a:gridCol w="5075640"/>
+              </a:tblGrid>
+              <a:tr h="871560">
+                <a:tc>
+                  <a:txBody>
+                    <a:bodyPr lIns="90000" rIns="90000" tIns="46800" bIns="46800"/>
+                    <a:p>
+                      <a:r>
+                        <a:rPr b="0" lang="en-IE" sz="1800" spc="-1" strike="noStrike">
+                          <a:latin typeface="Courier New"/>
+                        </a:rPr>
+                        <a:t>def myfunc(x):</a:t>
+                      </a:r>
+                      <a:endParaRPr b="0" lang="en-IE" sz="1800" spc="-1" strike="noStrike">
+                        <a:latin typeface="Courier New"/>
+                      </a:endParaRPr>
+                    </a:p>
+                    <a:p>
+                      <a:r>
+                        <a:rPr b="0" lang="en-IE" sz="1800" spc="-1" strike="noStrike">
+                          <a:latin typeface="Courier New"/>
+                        </a:rPr>
+                        <a:t>    </a:t>
+                      </a:r>
+                      <a:r>
+                        <a:rPr b="0" lang="en-IE" sz="1800" spc="-1" strike="noStrike">
+                          <a:latin typeface="Courier New"/>
+                        </a:rPr>
+                        <a:t>return x+x</a:t>
+                      </a:r>
+                      <a:endParaRPr b="0" lang="en-IE" sz="1800" spc="-1" strike="noStrike">
+                        <a:latin typeface="Courier New"/>
+                      </a:endParaRPr>
+                    </a:p>
+                    <a:p>
+                      <a:r>
+                        <a:rPr b="0" lang="en-IE" sz="1800" spc="-1" strike="noStrike">
+                          <a:latin typeface="Courier New"/>
+                        </a:rPr>
+                        <a:t>print (myfunc(5))</a:t>
+                      </a:r>
+                      <a:endParaRPr b="0" lang="en-IE" sz="1800" spc="-1" strike="noStrike">
+                        <a:latin typeface="Courier New"/>
+                      </a:endParaRPr>
+                    </a:p>
+                  </a:txBody>
+                  <a:tcPr marL="90000" marR="90000">
+                    <a:lnL w="720">
+                      <a:solidFill>
+                        <a:srgbClr val="ffffff"/>
+                      </a:solidFill>
+                    </a:lnL>
+                    <a:lnR w="720">
+                      <a:solidFill>
+                        <a:srgbClr val="ffffff"/>
+                      </a:solidFill>
+                    </a:lnR>
+                    <a:lnT w="720">
+                      <a:solidFill>
+                        <a:srgbClr val="ffffff"/>
+                      </a:solidFill>
+                    </a:lnT>
+                    <a:lnB w="720">
+                      <a:solidFill>
+                        <a:srgbClr val="ffffff"/>
+                      </a:solidFill>
+                    </a:lnB>
+                    <a:solidFill>
+                      <a:srgbClr val="b3b3b3"/>
+                    </a:solidFill>
+                  </a:tcPr>
+                </a:tc>
+              </a:tr>
+            </a:tbl>
+          </a:graphicData>
+        </a:graphic>
+      </p:graphicFrame>
+    </p:spTree>
+  </p:cSld>
+  <p:timing>
+    <p:tnLst>
+      <p:par>
+        <p:cTn id="75" dur="indefinite" restart="never" nodeType="tmRoot">
+          <p:childTnLst>
+            <p:seq>
+              <p:cTn id="76" dur="indefinite" nodeType="mainSeq"/>
+              <p:prevCondLst>
+                <p:cond delay="0" evt="onPrev">
+                  <p:tgtEl>
+                    <p:sldTgt/>
+                  </p:tgtEl>
+                </p:cond>
+              </p:prevCondLst>
+              <p:nextCondLst>
+                <p:cond delay="0" evt="onNext">
+                  <p:tgtEl>
+                    <p:sldTgt/>
+                  </p:tgtEl>
+                </p:cond>
+              </p:nextCondLst>
+            </p:seq>
+          </p:childTnLst>
+        </p:cTn>
+      </p:par>
+    </p:tnLst>
+  </p:timing>
+</p:sld>
+</file>
+
+<file path=ppt/slides/slide39.xml><?xml version="1.0" encoding="utf-8"?>
+<p:sld xmlns:a="http://schemas.openxmlformats.org/drawingml/2006/main" xmlns:p="http://schemas.openxmlformats.org/presentationml/2006/main" xmlns:r="http://schemas.openxmlformats.org/officeDocument/2006/relationships" xmlns:p14="http://schemas.microsoft.com/office/powerpoint/2010/main" xmlns:p15="http://schemas.microsoft.com/office/powerpoint/2012/main" xmlns:mc="http://schemas.openxmlformats.org/markup-compatibility/2006">
+  <p:cSld>
+    <p:spTree>
+      <p:nvGrpSpPr>
+        <p:cNvPr id="1" name=""/>
+        <p:cNvGrpSpPr/>
+        <p:nvPr/>
+      </p:nvGrpSpPr>
+      <p:grpSpPr>
+        <a:xfrm>
+          <a:off x="0" y="0"/>
+          <a:ext cx="0" cy="0"/>
+          <a:chOff x="0" y="0"/>
+          <a:chExt cx="0" cy="0"/>
+        </a:xfrm>
+      </p:grpSpPr>
+      <p:sp>
+        <p:nvSpPr>
+          <p:cNvPr id="183" name="TextShape 1"/>
+          <p:cNvSpPr txBox="1"/>
+          <p:nvPr/>
+        </p:nvSpPr>
+        <p:spPr>
+          <a:xfrm>
+            <a:off x="504000" y="301320"/>
+            <a:ext cx="9071640" cy="637560"/>
+          </a:xfrm>
+          <a:prstGeom prst="rect">
+            <a:avLst/>
+          </a:prstGeom>
+          <a:noFill/>
+          <a:ln>
+            <a:noFill/>
+          </a:ln>
+        </p:spPr>
+        <p:txBody>
+          <a:bodyPr lIns="0" rIns="0" tIns="0" bIns="0" anchor="ctr"/>
+          <a:p>
+            <a:pPr algn="ctr"/>
+            <a:r>
+              <a:rPr b="0" lang="en-IE" sz="4400" spc="-1" strike="noStrike">
+                <a:solidFill>
+                  <a:srgbClr val="ffffff"/>
+                </a:solidFill>
+                <a:latin typeface="Arial"/>
+              </a:rPr>
+              <a:t>Introduction to Python</a:t>
+            </a:r>
+            <a:endParaRPr b="0" lang="en-IE" sz="4400" spc="-1" strike="noStrike">
+              <a:solidFill>
+                <a:srgbClr val="ffffff"/>
+              </a:solidFill>
+              <a:latin typeface="Arial"/>
+            </a:endParaRPr>
+          </a:p>
+        </p:txBody>
+      </p:sp>
+      <p:sp>
+        <p:nvSpPr>
+          <p:cNvPr id="184" name="TextShape 2"/>
+          <p:cNvSpPr txBox="1"/>
+          <p:nvPr/>
+        </p:nvSpPr>
+        <p:spPr>
+          <a:xfrm>
+            <a:off x="504000" y="1769040"/>
+            <a:ext cx="9071640" cy="4384440"/>
+          </a:xfrm>
+          <a:prstGeom prst="rect">
+            <a:avLst/>
+          </a:prstGeom>
+          <a:noFill/>
+          <a:ln>
+            <a:noFill/>
+          </a:ln>
+        </p:spPr>
+        <p:txBody>
+          <a:bodyPr lIns="0" rIns="0" tIns="0" bIns="0"/>
+          <a:p>
+            <a:pPr marL="432000" indent="-324000">
+              <a:spcBef>
+                <a:spcPts val="1417"/>
+              </a:spcBef>
+              <a:buClr>
+                <a:srgbClr val="000000"/>
+              </a:buClr>
+              <a:buSzPct val="45000"/>
+              <a:buFont typeface="Wingdings" charset="2"/>
+              <a:buChar char=""/>
+            </a:pPr>
+            <a:r>
+              <a:rPr b="0" lang="en-IE" sz="3200" spc="-1" strike="noStrike">
+                <a:solidFill>
+                  <a:srgbClr val="0066cc"/>
+                </a:solidFill>
+                <a:latin typeface="Arial"/>
+              </a:rPr>
+              <a:t>Python also allows us to use third party libraries that are not part of the core distribution via the </a:t>
+            </a:r>
+            <a:r>
+              <a:rPr b="0" i="1" lang="en-IE" sz="3200" spc="-1" strike="noStrike">
+                <a:solidFill>
+                  <a:srgbClr val="0066cc"/>
+                </a:solidFill>
+                <a:latin typeface="Arial"/>
+              </a:rPr>
+              <a:t>import</a:t>
+            </a:r>
+            <a:r>
+              <a:rPr b="0" lang="en-IE" sz="3200" spc="-1" strike="noStrike">
+                <a:solidFill>
+                  <a:srgbClr val="0066cc"/>
+                </a:solidFill>
+                <a:latin typeface="Arial"/>
+              </a:rPr>
+              <a:t> statement. </a:t>
+            </a:r>
+            <a:endParaRPr b="0" lang="en-IE" sz="3200" spc="-1" strike="noStrike">
+              <a:solidFill>
+                <a:srgbClr val="0066cc"/>
+              </a:solidFill>
+              <a:latin typeface="Arial"/>
+            </a:endParaRPr>
+          </a:p>
+          <a:p>
+            <a:pPr marL="432000" indent="-324000">
+              <a:spcBef>
+                <a:spcPts val="1417"/>
+              </a:spcBef>
+              <a:buClr>
+                <a:srgbClr val="000000"/>
+              </a:buClr>
+              <a:buSzPct val="45000"/>
+              <a:buFont typeface="Wingdings" charset="2"/>
+              <a:buChar char=""/>
+            </a:pPr>
+            <a:endParaRPr b="0" lang="en-IE" sz="3200" spc="-1" strike="noStrike">
+              <a:solidFill>
+                <a:srgbClr val="0066cc"/>
+              </a:solidFill>
+              <a:latin typeface="Arial"/>
+            </a:endParaRPr>
+          </a:p>
+          <a:p>
+            <a:pPr marL="432000" indent="-324000">
+              <a:spcBef>
+                <a:spcPts val="1417"/>
+              </a:spcBef>
+              <a:buClr>
+                <a:srgbClr val="000000"/>
+              </a:buClr>
+              <a:buSzPct val="45000"/>
+              <a:buFont typeface="Wingdings" charset="2"/>
+              <a:buChar char=""/>
+            </a:pPr>
+            <a:endParaRPr b="0" lang="en-IE" sz="3200" spc="-1" strike="noStrike">
+              <a:solidFill>
+                <a:srgbClr val="0066cc"/>
+              </a:solidFill>
+              <a:latin typeface="Arial"/>
+            </a:endParaRPr>
+          </a:p>
+          <a:p>
+            <a:pPr marL="432000" indent="-324000">
+              <a:spcBef>
+                <a:spcPts val="1417"/>
+              </a:spcBef>
+              <a:buClr>
+                <a:srgbClr val="000000"/>
+              </a:buClr>
+              <a:buSzPct val="45000"/>
+              <a:buFont typeface="Wingdings" charset="2"/>
+              <a:buChar char=""/>
+            </a:pPr>
+            <a:endParaRPr b="0" lang="en-IE" sz="3200" spc="-1" strike="noStrike">
+              <a:solidFill>
+                <a:srgbClr val="0066cc"/>
+              </a:solidFill>
+              <a:latin typeface="Arial"/>
+            </a:endParaRPr>
+          </a:p>
+          <a:p>
+            <a:pPr marL="432000" indent="-324000">
+              <a:spcBef>
+                <a:spcPts val="1417"/>
+              </a:spcBef>
+              <a:buClr>
+                <a:srgbClr val="000000"/>
+              </a:buClr>
+              <a:buSzPct val="45000"/>
+              <a:buFont typeface="Wingdings" charset="2"/>
+              <a:buChar char=""/>
+            </a:pPr>
+            <a:r>
+              <a:rPr b="0" lang="en-IE" sz="3200" spc="-1" strike="noStrike">
+                <a:solidFill>
+                  <a:srgbClr val="0066cc"/>
+                </a:solidFill>
+                <a:latin typeface="Arial"/>
+              </a:rPr>
+              <a:t>The output of this program is the value of pi to a specific number of significant digits.  </a:t>
+            </a:r>
+            <a:endParaRPr b="0" lang="en-IE" sz="3200" spc="-1" strike="noStrike">
+              <a:solidFill>
+                <a:srgbClr val="0066cc"/>
+              </a:solidFill>
+              <a:latin typeface="Arial"/>
+            </a:endParaRPr>
+          </a:p>
+        </p:txBody>
+      </p:sp>
+      <p:graphicFrame>
+        <p:nvGraphicFramePr>
+          <p:cNvPr id="185" name="Table 3"/>
+          <p:cNvGraphicFramePr/>
+          <p:nvPr/>
+        </p:nvGraphicFramePr>
+        <p:xfrm>
+          <a:off x="1235160" y="3578760"/>
+          <a:ext cx="5075280" cy="871200"/>
+        </p:xfrm>
+        <a:graphic>
+          <a:graphicData uri="http://schemas.openxmlformats.org/drawingml/2006/table">
+            <a:tbl>
+              <a:tblPr/>
+              <a:tblGrid>
+                <a:gridCol w="5075640"/>
+              </a:tblGrid>
+              <a:tr h="871560">
+                <a:tc>
+                  <a:txBody>
+                    <a:bodyPr lIns="90000" rIns="90000" tIns="46800" bIns="46800"/>
+                    <a:p>
+                      <a:r>
+                        <a:rPr b="0" lang="en-IE" sz="1800" spc="-1" strike="noStrike">
+                          <a:latin typeface="Courier New"/>
+                        </a:rPr>
+                        <a:t>import math</a:t>
+                      </a:r>
+                      <a:endParaRPr b="0" lang="en-IE" sz="1800" spc="-1" strike="noStrike">
+                        <a:latin typeface="Courier New"/>
+                      </a:endParaRPr>
+                    </a:p>
+                    <a:p>
+                      <a:r>
+                        <a:rPr b="0" lang="en-IE" sz="1800" spc="-1" strike="noStrike">
+                          <a:latin typeface="Courier New"/>
+                        </a:rPr>
+                        <a:t>print (math.pi)</a:t>
+                      </a:r>
+                      <a:endParaRPr b="0" lang="en-IE" sz="1800" spc="-1" strike="noStrike">
+                        <a:latin typeface="Courier New"/>
+                      </a:endParaRPr>
+                    </a:p>
+                  </a:txBody>
+                  <a:tcPr marL="90000" marR="90000">
+                    <a:lnL w="720">
+                      <a:solidFill>
+                        <a:srgbClr val="ffffff"/>
+                      </a:solidFill>
+                    </a:lnL>
+                    <a:lnR w="720">
+                      <a:solidFill>
+                        <a:srgbClr val="ffffff"/>
+                      </a:solidFill>
+                    </a:lnR>
+                    <a:lnT w="720">
+                      <a:solidFill>
+                        <a:srgbClr val="ffffff"/>
+                      </a:solidFill>
+                    </a:lnT>
+                    <a:lnB w="720">
+                      <a:solidFill>
+                        <a:srgbClr val="ffffff"/>
+                      </a:solidFill>
+                    </a:lnB>
+                    <a:solidFill>
+                      <a:srgbClr val="b3b3b3"/>
+                    </a:solidFill>
+                  </a:tcPr>
+                </a:tc>
+              </a:tr>
+            </a:tbl>
+          </a:graphicData>
+        </a:graphic>
+      </p:graphicFrame>
+    </p:spTree>
+  </p:cSld>
+  <p:timing>
+    <p:tnLst>
+      <p:par>
+        <p:cTn id="77" dur="indefinite" restart="never" nodeType="tmRoot">
+          <p:childTnLst>
+            <p:seq>
+              <p:cTn id="78" dur="indefinite" nodeType="mainSeq"/>
+              <p:prevCondLst>
+                <p:cond delay="0" evt="onPrev">
+                  <p:tgtEl>
+                    <p:sldTgt/>
+                  </p:tgtEl>
+                </p:cond>
+              </p:prevCondLst>
+              <p:nextCondLst>
+                <p:cond delay="0" evt="onNext">
+                  <p:tgtEl>
+                    <p:sldTgt/>
+                  </p:tgtEl>
+                </p:cond>
+              </p:nextCondLst>
+            </p:seq>
+          </p:childTnLst>
+        </p:cTn>
+      </p:par>
+    </p:tnLst>
+  </p:timing>
+</p:sld>
+</file>
+
 <file path=ppt/slides/slide4.xml><?xml version="1.0" encoding="utf-8"?>
 <p:sld xmlns:a="http://schemas.openxmlformats.org/drawingml/2006/main" xmlns:p="http://schemas.openxmlformats.org/presentationml/2006/main" xmlns:r="http://schemas.openxmlformats.org/officeDocument/2006/relationships" xmlns:p14="http://schemas.microsoft.com/office/powerpoint/2010/main" xmlns:p15="http://schemas.microsoft.com/office/powerpoint/2012/main" xmlns:mc="http://schemas.openxmlformats.org/markup-compatibility/2006">
   <p:cSld>
@@ -10914,6 +14279,268 @@
           <p:childTnLst>
             <p:seq>
               <p:cTn id="8" dur="indefinite" nodeType="mainSeq"/>
+              <p:prevCondLst>
+                <p:cond delay="0" evt="onPrev">
+                  <p:tgtEl>
+                    <p:sldTgt/>
+                  </p:tgtEl>
+                </p:cond>
+              </p:prevCondLst>
+              <p:nextCondLst>
+                <p:cond delay="0" evt="onNext">
+                  <p:tgtEl>
+                    <p:sldTgt/>
+                  </p:tgtEl>
+                </p:cond>
+              </p:nextCondLst>
+            </p:seq>
+          </p:childTnLst>
+        </p:cTn>
+      </p:par>
+    </p:tnLst>
+  </p:timing>
+</p:sld>
+</file>
+
+<file path=ppt/slides/slide40.xml><?xml version="1.0" encoding="utf-8"?>
+<p:sld xmlns:a="http://schemas.openxmlformats.org/drawingml/2006/main" xmlns:p="http://schemas.openxmlformats.org/presentationml/2006/main" xmlns:r="http://schemas.openxmlformats.org/officeDocument/2006/relationships" xmlns:p14="http://schemas.microsoft.com/office/powerpoint/2010/main" xmlns:p15="http://schemas.microsoft.com/office/powerpoint/2012/main" xmlns:mc="http://schemas.openxmlformats.org/markup-compatibility/2006">
+  <p:cSld>
+    <p:spTree>
+      <p:nvGrpSpPr>
+        <p:cNvPr id="1" name=""/>
+        <p:cNvGrpSpPr/>
+        <p:nvPr/>
+      </p:nvGrpSpPr>
+      <p:grpSpPr>
+        <a:xfrm>
+          <a:off x="0" y="0"/>
+          <a:ext cx="0" cy="0"/>
+          <a:chOff x="0" y="0"/>
+          <a:chExt cx="0" cy="0"/>
+        </a:xfrm>
+      </p:grpSpPr>
+      <p:sp>
+        <p:nvSpPr>
+          <p:cNvPr id="186" name="TextShape 1"/>
+          <p:cNvSpPr txBox="1"/>
+          <p:nvPr/>
+        </p:nvSpPr>
+        <p:spPr>
+          <a:xfrm>
+            <a:off x="504000" y="301320"/>
+            <a:ext cx="9071640" cy="637560"/>
+          </a:xfrm>
+          <a:prstGeom prst="rect">
+            <a:avLst/>
+          </a:prstGeom>
+          <a:noFill/>
+          <a:ln>
+            <a:noFill/>
+          </a:ln>
+        </p:spPr>
+        <p:txBody>
+          <a:bodyPr lIns="0" rIns="0" tIns="0" bIns="0" anchor="ctr"/>
+          <a:p>
+            <a:pPr algn="ctr"/>
+            <a:r>
+              <a:rPr b="0" lang="en-IE" sz="4400" spc="-1" strike="noStrike">
+                <a:solidFill>
+                  <a:srgbClr val="ffffff"/>
+                </a:solidFill>
+                <a:latin typeface="Arial"/>
+              </a:rPr>
+              <a:t>Introduction to Python</a:t>
+            </a:r>
+            <a:endParaRPr b="0" lang="en-IE" sz="4400" spc="-1" strike="noStrike">
+              <a:solidFill>
+                <a:srgbClr val="ffffff"/>
+              </a:solidFill>
+              <a:latin typeface="Arial"/>
+            </a:endParaRPr>
+          </a:p>
+        </p:txBody>
+      </p:sp>
+      <p:sp>
+        <p:nvSpPr>
+          <p:cNvPr id="187" name="TextShape 2"/>
+          <p:cNvSpPr txBox="1"/>
+          <p:nvPr/>
+        </p:nvSpPr>
+        <p:spPr>
+          <a:xfrm>
+            <a:off x="504000" y="1769040"/>
+            <a:ext cx="9071640" cy="4384440"/>
+          </a:xfrm>
+          <a:prstGeom prst="rect">
+            <a:avLst/>
+          </a:prstGeom>
+          <a:noFill/>
+          <a:ln>
+            <a:noFill/>
+          </a:ln>
+        </p:spPr>
+        <p:txBody>
+          <a:bodyPr lIns="0" rIns="0" tIns="0" bIns="0"/>
+          <a:p>
+            <a:pPr marL="432000" indent="-324000">
+              <a:spcBef>
+                <a:spcPts val="1417"/>
+              </a:spcBef>
+              <a:buClr>
+                <a:srgbClr val="000000"/>
+              </a:buClr>
+              <a:buSzPct val="45000"/>
+              <a:buFont typeface="Wingdings" charset="2"/>
+              <a:buChar char=""/>
+            </a:pPr>
+            <a:r>
+              <a:rPr b="0" lang="en-IE" sz="3200" spc="-1" strike="noStrike">
+                <a:solidFill>
+                  <a:srgbClr val="0066cc"/>
+                </a:solidFill>
+                <a:latin typeface="Arial"/>
+              </a:rPr>
+              <a:t>In this course we will use the following libraries</a:t>
+            </a:r>
+            <a:endParaRPr b="0" lang="en-IE" sz="3200" spc="-1" strike="noStrike">
+              <a:solidFill>
+                <a:srgbClr val="0066cc"/>
+              </a:solidFill>
+              <a:latin typeface="Arial"/>
+            </a:endParaRPr>
+          </a:p>
+          <a:p>
+            <a:pPr lvl="1" marL="864000" indent="-324000">
+              <a:spcBef>
+                <a:spcPts val="1134"/>
+              </a:spcBef>
+              <a:buClr>
+                <a:srgbClr val="000000"/>
+              </a:buClr>
+              <a:buSzPct val="75000"/>
+              <a:buFont typeface="Symbol" charset="2"/>
+              <a:buChar char=""/>
+            </a:pPr>
+            <a:r>
+              <a:rPr b="0" lang="en-IE" sz="2800" spc="-1" strike="noStrike">
+                <a:solidFill>
+                  <a:srgbClr val="0066cc"/>
+                </a:solidFill>
+                <a:latin typeface="Arial"/>
+              </a:rPr>
+              <a:t>Quandl (For acquiring and analyzing financial data)</a:t>
+            </a:r>
+            <a:endParaRPr b="0" lang="en-IE" sz="2800" spc="-1" strike="noStrike">
+              <a:solidFill>
+                <a:srgbClr val="0066cc"/>
+              </a:solidFill>
+              <a:latin typeface="Arial"/>
+            </a:endParaRPr>
+          </a:p>
+          <a:p>
+            <a:pPr lvl="1" marL="864000" indent="-324000">
+              <a:spcBef>
+                <a:spcPts val="1134"/>
+              </a:spcBef>
+              <a:buClr>
+                <a:srgbClr val="000000"/>
+              </a:buClr>
+              <a:buSzPct val="75000"/>
+              <a:buFont typeface="Symbol" charset="2"/>
+              <a:buChar char=""/>
+            </a:pPr>
+            <a:r>
+              <a:rPr b="0" lang="en-IE" sz="2800" spc="-1" strike="noStrike">
+                <a:solidFill>
+                  <a:srgbClr val="0066cc"/>
+                </a:solidFill>
+                <a:latin typeface="Arial"/>
+              </a:rPr>
+              <a:t>Numpy (Primarily for manipulating vectors and </a:t>
+            </a:r>
+            <a:r>
+              <a:rPr b="0" lang="en-IE" sz="2800" spc="-1" strike="noStrike">
+                <a:solidFill>
+                  <a:srgbClr val="0066cc"/>
+                </a:solidFill>
+                <a:latin typeface="Arial"/>
+              </a:rPr>
+              <a:t>matrices)</a:t>
+            </a:r>
+            <a:endParaRPr b="0" lang="en-IE" sz="2800" spc="-1" strike="noStrike">
+              <a:solidFill>
+                <a:srgbClr val="0066cc"/>
+              </a:solidFill>
+              <a:latin typeface="Arial"/>
+            </a:endParaRPr>
+          </a:p>
+          <a:p>
+            <a:pPr lvl="1" marL="864000" indent="-324000">
+              <a:spcBef>
+                <a:spcPts val="1134"/>
+              </a:spcBef>
+              <a:buClr>
+                <a:srgbClr val="000000"/>
+              </a:buClr>
+              <a:buSzPct val="75000"/>
+              <a:buFont typeface="Symbol" charset="2"/>
+              <a:buChar char=""/>
+            </a:pPr>
+            <a:r>
+              <a:rPr b="0" lang="en-IE" sz="2800" spc="-1" strike="noStrike">
+                <a:solidFill>
+                  <a:srgbClr val="0066cc"/>
+                </a:solidFill>
+                <a:latin typeface="Arial"/>
+              </a:rPr>
+              <a:t>Pandas (For general data science)</a:t>
+            </a:r>
+            <a:endParaRPr b="0" lang="en-IE" sz="2800" spc="-1" strike="noStrike">
+              <a:solidFill>
+                <a:srgbClr val="0066cc"/>
+              </a:solidFill>
+              <a:latin typeface="Arial"/>
+            </a:endParaRPr>
+          </a:p>
+          <a:p>
+            <a:pPr lvl="1" marL="864000" indent="-324000">
+              <a:spcBef>
+                <a:spcPts val="1134"/>
+              </a:spcBef>
+              <a:buClr>
+                <a:srgbClr val="000000"/>
+              </a:buClr>
+              <a:buSzPct val="75000"/>
+              <a:buFont typeface="Symbol" charset="2"/>
+              <a:buChar char=""/>
+            </a:pPr>
+            <a:r>
+              <a:rPr b="0" lang="en-IE" sz="2800" spc="-1" strike="noStrike">
+                <a:solidFill>
+                  <a:srgbClr val="0066cc"/>
+                </a:solidFill>
+                <a:latin typeface="Arial"/>
+              </a:rPr>
+              <a:t>MatPlotLib and Seaborn (for data visualization)  </a:t>
+            </a:r>
+            <a:endParaRPr b="0" lang="en-IE" sz="2800" spc="-1" strike="noStrike">
+              <a:solidFill>
+                <a:srgbClr val="0066cc"/>
+              </a:solidFill>
+              <a:latin typeface="Arial"/>
+            </a:endParaRPr>
+          </a:p>
+        </p:txBody>
+      </p:sp>
+    </p:spTree>
+  </p:cSld>
+  <p:timing>
+    <p:tnLst>
+      <p:par>
+        <p:cTn id="79" dur="indefinite" restart="never" nodeType="tmRoot">
+          <p:childTnLst>
+            <p:seq>
+              <p:cTn id="80" dur="indefinite" nodeType="mainSeq"/>
               <p:prevCondLst>
                 <p:cond delay="0" evt="onPrev">
                   <p:tgtEl>
@@ -11054,7 +14681,16 @@
                 </a:solidFill>
                 <a:latin typeface="Arial"/>
               </a:rPr>
-              <a:t>A Data Scientist (DS) generally performs the following tasks. </a:t>
+              <a:t>A Data Scientist (DS) generally performs the </a:t>
+            </a:r>
+            <a:r>
+              <a:rPr b="0" lang="en-IE" sz="3200" spc="-1" strike="noStrike">
+                <a:solidFill>
+                  <a:srgbClr val="0066cc"/>
+                </a:solidFill>
+                <a:latin typeface="Arial"/>
+              </a:rPr>
+              <a:t>following tasks. </a:t>
             </a:r>
             <a:endParaRPr b="0" lang="en-IE" sz="3200" spc="-1" strike="noStrike">
               <a:solidFill>
@@ -11082,7 +14718,16 @@
                 </a:solidFill>
                 <a:latin typeface="Arial"/>
               </a:rPr>
-              <a:t>Performing analysis and visualization of output to provide meaningful insights to management. </a:t>
+              <a:t>Performing analysis and visualization of output to </a:t>
+            </a:r>
+            <a:r>
+              <a:rPr b="0" lang="en-IE" sz="2800" spc="-1" strike="noStrike">
+                <a:solidFill>
+                  <a:srgbClr val="0066cc"/>
+                </a:solidFill>
+                <a:latin typeface="Arial"/>
+              </a:rPr>
+              <a:t>provide meaningful insights to management. </a:t>
             </a:r>
             <a:endParaRPr b="0" lang="en-IE" sz="2800" spc="-1" strike="noStrike">
               <a:solidFill>
@@ -11110,7 +14755,16 @@
                 </a:solidFill>
                 <a:latin typeface="Arial"/>
               </a:rPr>
-              <a:t>Track and record all steps for any regulatory requirements. </a:t>
+              <a:t>Track and record all steps for any regulatory </a:t>
+            </a:r>
+            <a:r>
+              <a:rPr b="0" lang="en-IE" sz="2800" spc="-1" strike="noStrike">
+                <a:solidFill>
+                  <a:srgbClr val="0066cc"/>
+                </a:solidFill>
+                <a:latin typeface="Arial"/>
+              </a:rPr>
+              <a:t>requirements. </a:t>
             </a:r>
             <a:endParaRPr b="0" lang="en-IE" sz="2800" spc="-1" strike="noStrike">
               <a:solidFill>
@@ -11849,7 +15503,43 @@
                 </a:solidFill>
                 <a:latin typeface="Arial"/>
               </a:rPr>
-              <a:t>Often times, data sets will be extraordinarily large (Big Data). Thus understanding tools like Apache’s Hadoop and Spark and data extraction algorithms like Map Reduce may be necessary for project success. </a:t>
+              <a:t>Often times, data sets will be extraordinarily </a:t>
+            </a:r>
+            <a:r>
+              <a:rPr b="0" lang="en-IE" sz="3200" spc="-1" strike="noStrike">
+                <a:solidFill>
+                  <a:srgbClr val="0066cc"/>
+                </a:solidFill>
+                <a:latin typeface="Arial"/>
+              </a:rPr>
+              <a:t>large (Big Data). Thus understanding tools like </a:t>
+            </a:r>
+            <a:r>
+              <a:rPr b="0" lang="en-IE" sz="3200" spc="-1" strike="noStrike">
+                <a:solidFill>
+                  <a:srgbClr val="0066cc"/>
+                </a:solidFill>
+                <a:latin typeface="Arial"/>
+              </a:rPr>
+              <a:t>Apache’s Hadoop and Spark and data </a:t>
+            </a:r>
+            <a:r>
+              <a:rPr b="0" lang="en-IE" sz="3200" spc="-1" strike="noStrike">
+                <a:solidFill>
+                  <a:srgbClr val="0066cc"/>
+                </a:solidFill>
+                <a:latin typeface="Arial"/>
+              </a:rPr>
+              <a:t>extraction algorithms like Map Reduce may be </a:t>
+            </a:r>
+            <a:r>
+              <a:rPr b="0" lang="en-IE" sz="3200" spc="-1" strike="noStrike">
+                <a:solidFill>
+                  <a:srgbClr val="0066cc"/>
+                </a:solidFill>
+                <a:latin typeface="Arial"/>
+              </a:rPr>
+              <a:t>necessary for project success. </a:t>
             </a:r>
             <a:endParaRPr b="0" lang="en-IE" sz="3200" spc="-1" strike="noStrike">
               <a:solidFill>
@@ -12158,7 +15848,25 @@
                 </a:solidFill>
                 <a:latin typeface="Arial"/>
               </a:rPr>
-              <a:t>This is one of the most critical, yet most tedious and tine consuming tasks that the DS must perform (Garbage in = Garbage out). </a:t>
+              <a:t>This is one of the most critical, yet most </a:t>
+            </a:r>
+            <a:r>
+              <a:rPr b="0" lang="en-IE" sz="3200" spc="-1" strike="noStrike">
+                <a:solidFill>
+                  <a:srgbClr val="0066cc"/>
+                </a:solidFill>
+                <a:latin typeface="Arial"/>
+              </a:rPr>
+              <a:t>tedious and tine consuming tasks that the DS </a:t>
+            </a:r>
+            <a:r>
+              <a:rPr b="0" lang="en-IE" sz="3200" spc="-1" strike="noStrike">
+                <a:solidFill>
+                  <a:srgbClr val="0066cc"/>
+                </a:solidFill>
+                <a:latin typeface="Arial"/>
+              </a:rPr>
+              <a:t>must perform (Garbage in = Garbage out). </a:t>
             </a:r>
             <a:endParaRPr b="0" lang="en-IE" sz="3200" spc="-1" strike="noStrike">
               <a:solidFill>

</xml_diff>